<commit_message>
Graphes avec noms et changement de pourcentages sur le Rapport
</commit_message>
<xml_diff>
--- a/doc/Temps-Réel et Multi-coeurs.pptx
+++ b/doc/Temps-Réel et Multi-coeurs.pptx
@@ -22,7 +22,7 @@
     <p:sldId id="269" r:id="rId17"/>
   </p:sldIdLst>
   <p:sldSz cx="10080625" cy="7559675"/>
-  <p:notesSz cx="7559675" cy="10691812"/>
+  <p:notesSz cx="7772400" cy="10058400"/>
 </p:presentation>
 </file>
 
@@ -67,7 +67,7 @@
       </p:grpSpPr>
       <p:sp>
         <p:nvSpPr>
-          <p:cNvPr id="35" name="PlaceHolder 1"/>
+          <p:cNvPr id="32" name="PlaceHolder 1"/>
           <p:cNvSpPr>
             <a:spLocks noGrp="1"/>
           </p:cNvSpPr>
@@ -87,13 +87,14 @@
         <p:txBody>
           <a:bodyPr lIns="0" rIns="0" tIns="0" bIns="0" anchor="ctr"/>
           <a:p>
-            <a:endParaRPr/>
-          </a:p>
-        </p:txBody>
-      </p:sp>
-      <p:sp>
-        <p:nvSpPr>
-          <p:cNvPr id="36" name="PlaceHolder 2"/>
+            <a:pPr algn="ctr"/>
+            <a:endParaRPr/>
+          </a:p>
+        </p:txBody>
+      </p:sp>
+      <p:sp>
+        <p:nvSpPr>
+          <p:cNvPr id="33" name="PlaceHolder 2"/>
           <p:cNvSpPr>
             <a:spLocks noGrp="1"/>
           </p:cNvSpPr>
@@ -119,7 +120,7 @@
       </p:sp>
       <p:sp>
         <p:nvSpPr>
-          <p:cNvPr id="37" name="PlaceHolder 3"/>
+          <p:cNvPr id="34" name="PlaceHolder 3"/>
           <p:cNvSpPr>
             <a:spLocks noGrp="1"/>
           </p:cNvSpPr>
@@ -167,7 +168,7 @@
       </p:grpSpPr>
       <p:sp>
         <p:nvSpPr>
-          <p:cNvPr id="38" name="PlaceHolder 1"/>
+          <p:cNvPr id="35" name="PlaceHolder 1"/>
           <p:cNvSpPr>
             <a:spLocks noGrp="1"/>
           </p:cNvSpPr>
@@ -187,13 +188,14 @@
         <p:txBody>
           <a:bodyPr lIns="0" rIns="0" tIns="0" bIns="0" anchor="ctr"/>
           <a:p>
-            <a:endParaRPr/>
-          </a:p>
-        </p:txBody>
-      </p:sp>
-      <p:sp>
-        <p:nvSpPr>
-          <p:cNvPr id="39" name="PlaceHolder 2"/>
+            <a:pPr algn="ctr"/>
+            <a:endParaRPr/>
+          </a:p>
+        </p:txBody>
+      </p:sp>
+      <p:sp>
+        <p:nvSpPr>
+          <p:cNvPr id="36" name="PlaceHolder 2"/>
           <p:cNvSpPr>
             <a:spLocks noGrp="1"/>
           </p:cNvSpPr>
@@ -219,7 +221,7 @@
       </p:sp>
       <p:sp>
         <p:nvSpPr>
-          <p:cNvPr id="40" name="PlaceHolder 3"/>
+          <p:cNvPr id="37" name="PlaceHolder 3"/>
           <p:cNvSpPr>
             <a:spLocks noGrp="1"/>
           </p:cNvSpPr>
@@ -245,7 +247,7 @@
       </p:sp>
       <p:sp>
         <p:nvSpPr>
-          <p:cNvPr id="41" name="PlaceHolder 4"/>
+          <p:cNvPr id="38" name="PlaceHolder 4"/>
           <p:cNvSpPr>
             <a:spLocks noGrp="1"/>
           </p:cNvSpPr>
@@ -271,7 +273,7 @@
       </p:sp>
       <p:sp>
         <p:nvSpPr>
-          <p:cNvPr id="42" name="PlaceHolder 5"/>
+          <p:cNvPr id="39" name="PlaceHolder 5"/>
           <p:cNvSpPr>
             <a:spLocks noGrp="1"/>
           </p:cNvSpPr>
@@ -319,7 +321,7 @@
       </p:grpSpPr>
       <p:sp>
         <p:nvSpPr>
-          <p:cNvPr id="43" name="PlaceHolder 1"/>
+          <p:cNvPr id="40" name="PlaceHolder 1"/>
           <p:cNvSpPr>
             <a:spLocks noGrp="1"/>
           </p:cNvSpPr>
@@ -339,13 +341,14 @@
         <p:txBody>
           <a:bodyPr lIns="0" rIns="0" tIns="0" bIns="0" anchor="ctr"/>
           <a:p>
-            <a:endParaRPr/>
-          </a:p>
-        </p:txBody>
-      </p:sp>
-      <p:sp>
-        <p:nvSpPr>
-          <p:cNvPr id="44" name="PlaceHolder 2"/>
+            <a:pPr algn="ctr"/>
+            <a:endParaRPr/>
+          </a:p>
+        </p:txBody>
+      </p:sp>
+      <p:sp>
+        <p:nvSpPr>
+          <p:cNvPr id="41" name="PlaceHolder 2"/>
           <p:cNvSpPr>
             <a:spLocks noGrp="1"/>
           </p:cNvSpPr>
@@ -371,7 +374,7 @@
       </p:sp>
       <p:sp>
         <p:nvSpPr>
-          <p:cNvPr id="45" name="PlaceHolder 3"/>
+          <p:cNvPr id="42" name="PlaceHolder 3"/>
           <p:cNvSpPr>
             <a:spLocks noGrp="1"/>
           </p:cNvSpPr>
@@ -397,7 +400,7 @@
       </p:sp>
       <p:pic>
         <p:nvPicPr>
-          <p:cNvPr id="46" name="" descr=""/>
+          <p:cNvPr id="43" name="" descr=""/>
           <p:cNvPicPr/>
           <p:nvPr/>
         </p:nvPicPr>
@@ -422,7 +425,7 @@
       </p:pic>
       <p:pic>
         <p:nvPicPr>
-          <p:cNvPr id="47" name="" descr=""/>
+          <p:cNvPr id="44" name="" descr=""/>
           <p:cNvPicPr/>
           <p:nvPr/>
         </p:nvPicPr>
@@ -491,7 +494,7 @@
       </p:grpSpPr>
       <p:sp>
         <p:nvSpPr>
-          <p:cNvPr id="57" name="PlaceHolder 1"/>
+          <p:cNvPr id="51" name="PlaceHolder 1"/>
           <p:cNvSpPr>
             <a:spLocks noGrp="1"/>
           </p:cNvSpPr>
@@ -511,13 +514,14 @@
         <p:txBody>
           <a:bodyPr lIns="0" rIns="0" tIns="0" bIns="0" anchor="ctr"/>
           <a:p>
-            <a:endParaRPr/>
-          </a:p>
-        </p:txBody>
-      </p:sp>
-      <p:sp>
-        <p:nvSpPr>
-          <p:cNvPr id="58" name="PlaceHolder 2"/>
+            <a:pPr algn="ctr"/>
+            <a:endParaRPr/>
+          </a:p>
+        </p:txBody>
+      </p:sp>
+      <p:sp>
+        <p:nvSpPr>
+          <p:cNvPr id="52" name="PlaceHolder 2"/>
           <p:cNvSpPr>
             <a:spLocks noGrp="1"/>
           </p:cNvSpPr>
@@ -566,7 +570,7 @@
       </p:grpSpPr>
       <p:sp>
         <p:nvSpPr>
-          <p:cNvPr id="59" name="PlaceHolder 1"/>
+          <p:cNvPr id="53" name="PlaceHolder 1"/>
           <p:cNvSpPr>
             <a:spLocks noGrp="1"/>
           </p:cNvSpPr>
@@ -586,13 +590,14 @@
         <p:txBody>
           <a:bodyPr lIns="0" rIns="0" tIns="0" bIns="0" anchor="ctr"/>
           <a:p>
-            <a:endParaRPr/>
-          </a:p>
-        </p:txBody>
-      </p:sp>
-      <p:sp>
-        <p:nvSpPr>
-          <p:cNvPr id="60" name="PlaceHolder 2"/>
+            <a:pPr algn="ctr"/>
+            <a:endParaRPr/>
+          </a:p>
+        </p:txBody>
+      </p:sp>
+      <p:sp>
+        <p:nvSpPr>
+          <p:cNvPr id="54" name="PlaceHolder 2"/>
           <p:cNvSpPr>
             <a:spLocks noGrp="1"/>
           </p:cNvSpPr>
@@ -640,7 +645,7 @@
       </p:grpSpPr>
       <p:sp>
         <p:nvSpPr>
-          <p:cNvPr id="61" name="PlaceHolder 1"/>
+          <p:cNvPr id="55" name="PlaceHolder 1"/>
           <p:cNvSpPr>
             <a:spLocks noGrp="1"/>
           </p:cNvSpPr>
@@ -660,13 +665,14 @@
         <p:txBody>
           <a:bodyPr lIns="0" rIns="0" tIns="0" bIns="0" anchor="ctr"/>
           <a:p>
-            <a:endParaRPr/>
-          </a:p>
-        </p:txBody>
-      </p:sp>
-      <p:sp>
-        <p:nvSpPr>
-          <p:cNvPr id="62" name="PlaceHolder 2"/>
+            <a:pPr algn="ctr"/>
+            <a:endParaRPr/>
+          </a:p>
+        </p:txBody>
+      </p:sp>
+      <p:sp>
+        <p:nvSpPr>
+          <p:cNvPr id="56" name="PlaceHolder 2"/>
           <p:cNvSpPr>
             <a:spLocks noGrp="1"/>
           </p:cNvSpPr>
@@ -692,7 +698,7 @@
       </p:sp>
       <p:sp>
         <p:nvSpPr>
-          <p:cNvPr id="63" name="PlaceHolder 3"/>
+          <p:cNvPr id="57" name="PlaceHolder 3"/>
           <p:cNvSpPr>
             <a:spLocks noGrp="1"/>
           </p:cNvSpPr>
@@ -740,7 +746,7 @@
       </p:grpSpPr>
       <p:sp>
         <p:nvSpPr>
-          <p:cNvPr id="64" name="PlaceHolder 1"/>
+          <p:cNvPr id="58" name="PlaceHolder 1"/>
           <p:cNvSpPr>
             <a:spLocks noGrp="1"/>
           </p:cNvSpPr>
@@ -760,6 +766,7 @@
         <p:txBody>
           <a:bodyPr lIns="0" rIns="0" tIns="0" bIns="0" anchor="ctr"/>
           <a:p>
+            <a:pPr algn="ctr"/>
             <a:endParaRPr/>
           </a:p>
         </p:txBody>
@@ -788,7 +795,7 @@
       </p:grpSpPr>
       <p:sp>
         <p:nvSpPr>
-          <p:cNvPr id="65" name="PlaceHolder 1"/>
+          <p:cNvPr id="59" name="PlaceHolder 1"/>
           <p:cNvSpPr>
             <a:spLocks noGrp="1"/>
           </p:cNvSpPr>
@@ -837,7 +844,7 @@
       </p:grpSpPr>
       <p:sp>
         <p:nvSpPr>
-          <p:cNvPr id="66" name="PlaceHolder 1"/>
+          <p:cNvPr id="60" name="PlaceHolder 1"/>
           <p:cNvSpPr>
             <a:spLocks noGrp="1"/>
           </p:cNvSpPr>
@@ -857,13 +864,14 @@
         <p:txBody>
           <a:bodyPr lIns="0" rIns="0" tIns="0" bIns="0" anchor="ctr"/>
           <a:p>
-            <a:endParaRPr/>
-          </a:p>
-        </p:txBody>
-      </p:sp>
-      <p:sp>
-        <p:nvSpPr>
-          <p:cNvPr id="67" name="PlaceHolder 2"/>
+            <a:pPr algn="ctr"/>
+            <a:endParaRPr/>
+          </a:p>
+        </p:txBody>
+      </p:sp>
+      <p:sp>
+        <p:nvSpPr>
+          <p:cNvPr id="61" name="PlaceHolder 2"/>
           <p:cNvSpPr>
             <a:spLocks noGrp="1"/>
           </p:cNvSpPr>
@@ -889,7 +897,7 @@
       </p:sp>
       <p:sp>
         <p:nvSpPr>
-          <p:cNvPr id="68" name="PlaceHolder 3"/>
+          <p:cNvPr id="62" name="PlaceHolder 3"/>
           <p:cNvSpPr>
             <a:spLocks noGrp="1"/>
           </p:cNvSpPr>
@@ -915,7 +923,7 @@
       </p:sp>
       <p:sp>
         <p:nvSpPr>
-          <p:cNvPr id="69" name="PlaceHolder 4"/>
+          <p:cNvPr id="63" name="PlaceHolder 4"/>
           <p:cNvSpPr>
             <a:spLocks noGrp="1"/>
           </p:cNvSpPr>
@@ -963,7 +971,7 @@
       </p:grpSpPr>
       <p:sp>
         <p:nvSpPr>
-          <p:cNvPr id="14" name="PlaceHolder 1"/>
+          <p:cNvPr id="11" name="PlaceHolder 1"/>
           <p:cNvSpPr>
             <a:spLocks noGrp="1"/>
           </p:cNvSpPr>
@@ -983,13 +991,14 @@
         <p:txBody>
           <a:bodyPr lIns="0" rIns="0" tIns="0" bIns="0" anchor="ctr"/>
           <a:p>
-            <a:endParaRPr/>
-          </a:p>
-        </p:txBody>
-      </p:sp>
-      <p:sp>
-        <p:nvSpPr>
-          <p:cNvPr id="15" name="PlaceHolder 2"/>
+            <a:pPr algn="ctr"/>
+            <a:endParaRPr/>
+          </a:p>
+        </p:txBody>
+      </p:sp>
+      <p:sp>
+        <p:nvSpPr>
+          <p:cNvPr id="12" name="PlaceHolder 2"/>
           <p:cNvSpPr>
             <a:spLocks noGrp="1"/>
           </p:cNvSpPr>
@@ -1038,7 +1047,7 @@
       </p:grpSpPr>
       <p:sp>
         <p:nvSpPr>
-          <p:cNvPr id="70" name="PlaceHolder 1"/>
+          <p:cNvPr id="64" name="PlaceHolder 1"/>
           <p:cNvSpPr>
             <a:spLocks noGrp="1"/>
           </p:cNvSpPr>
@@ -1058,13 +1067,14 @@
         <p:txBody>
           <a:bodyPr lIns="0" rIns="0" tIns="0" bIns="0" anchor="ctr"/>
           <a:p>
-            <a:endParaRPr/>
-          </a:p>
-        </p:txBody>
-      </p:sp>
-      <p:sp>
-        <p:nvSpPr>
-          <p:cNvPr id="71" name="PlaceHolder 2"/>
+            <a:pPr algn="ctr"/>
+            <a:endParaRPr/>
+          </a:p>
+        </p:txBody>
+      </p:sp>
+      <p:sp>
+        <p:nvSpPr>
+          <p:cNvPr id="65" name="PlaceHolder 2"/>
           <p:cNvSpPr>
             <a:spLocks noGrp="1"/>
           </p:cNvSpPr>
@@ -1090,7 +1100,7 @@
       </p:sp>
       <p:sp>
         <p:nvSpPr>
-          <p:cNvPr id="72" name="PlaceHolder 3"/>
+          <p:cNvPr id="66" name="PlaceHolder 3"/>
           <p:cNvSpPr>
             <a:spLocks noGrp="1"/>
           </p:cNvSpPr>
@@ -1116,7 +1126,7 @@
       </p:sp>
       <p:sp>
         <p:nvSpPr>
-          <p:cNvPr id="73" name="PlaceHolder 4"/>
+          <p:cNvPr id="67" name="PlaceHolder 4"/>
           <p:cNvSpPr>
             <a:spLocks noGrp="1"/>
           </p:cNvSpPr>
@@ -1164,7 +1174,7 @@
       </p:grpSpPr>
       <p:sp>
         <p:nvSpPr>
-          <p:cNvPr id="74" name="PlaceHolder 1"/>
+          <p:cNvPr id="68" name="PlaceHolder 1"/>
           <p:cNvSpPr>
             <a:spLocks noGrp="1"/>
           </p:cNvSpPr>
@@ -1184,13 +1194,14 @@
         <p:txBody>
           <a:bodyPr lIns="0" rIns="0" tIns="0" bIns="0" anchor="ctr"/>
           <a:p>
-            <a:endParaRPr/>
-          </a:p>
-        </p:txBody>
-      </p:sp>
-      <p:sp>
-        <p:nvSpPr>
-          <p:cNvPr id="75" name="PlaceHolder 2"/>
+            <a:pPr algn="ctr"/>
+            <a:endParaRPr/>
+          </a:p>
+        </p:txBody>
+      </p:sp>
+      <p:sp>
+        <p:nvSpPr>
+          <p:cNvPr id="69" name="PlaceHolder 2"/>
           <p:cNvSpPr>
             <a:spLocks noGrp="1"/>
           </p:cNvSpPr>
@@ -1216,7 +1227,7 @@
       </p:sp>
       <p:sp>
         <p:nvSpPr>
-          <p:cNvPr id="76" name="PlaceHolder 3"/>
+          <p:cNvPr id="70" name="PlaceHolder 3"/>
           <p:cNvSpPr>
             <a:spLocks noGrp="1"/>
           </p:cNvSpPr>
@@ -1242,7 +1253,7 @@
       </p:sp>
       <p:sp>
         <p:nvSpPr>
-          <p:cNvPr id="77" name="PlaceHolder 4"/>
+          <p:cNvPr id="71" name="PlaceHolder 4"/>
           <p:cNvSpPr>
             <a:spLocks noGrp="1"/>
           </p:cNvSpPr>
@@ -1290,7 +1301,7 @@
       </p:grpSpPr>
       <p:sp>
         <p:nvSpPr>
-          <p:cNvPr id="78" name="PlaceHolder 1"/>
+          <p:cNvPr id="72" name="PlaceHolder 1"/>
           <p:cNvSpPr>
             <a:spLocks noGrp="1"/>
           </p:cNvSpPr>
@@ -1310,13 +1321,14 @@
         <p:txBody>
           <a:bodyPr lIns="0" rIns="0" tIns="0" bIns="0" anchor="ctr"/>
           <a:p>
-            <a:endParaRPr/>
-          </a:p>
-        </p:txBody>
-      </p:sp>
-      <p:sp>
-        <p:nvSpPr>
-          <p:cNvPr id="79" name="PlaceHolder 2"/>
+            <a:pPr algn="ctr"/>
+            <a:endParaRPr/>
+          </a:p>
+        </p:txBody>
+      </p:sp>
+      <p:sp>
+        <p:nvSpPr>
+          <p:cNvPr id="73" name="PlaceHolder 2"/>
           <p:cNvSpPr>
             <a:spLocks noGrp="1"/>
           </p:cNvSpPr>
@@ -1342,7 +1354,7 @@
       </p:sp>
       <p:sp>
         <p:nvSpPr>
-          <p:cNvPr id="80" name="PlaceHolder 3"/>
+          <p:cNvPr id="74" name="PlaceHolder 3"/>
           <p:cNvSpPr>
             <a:spLocks noGrp="1"/>
           </p:cNvSpPr>
@@ -1390,7 +1402,7 @@
       </p:grpSpPr>
       <p:sp>
         <p:nvSpPr>
-          <p:cNvPr id="81" name="PlaceHolder 1"/>
+          <p:cNvPr id="75" name="PlaceHolder 1"/>
           <p:cNvSpPr>
             <a:spLocks noGrp="1"/>
           </p:cNvSpPr>
@@ -1410,13 +1422,14 @@
         <p:txBody>
           <a:bodyPr lIns="0" rIns="0" tIns="0" bIns="0" anchor="ctr"/>
           <a:p>
-            <a:endParaRPr/>
-          </a:p>
-        </p:txBody>
-      </p:sp>
-      <p:sp>
-        <p:nvSpPr>
-          <p:cNvPr id="82" name="PlaceHolder 2"/>
+            <a:pPr algn="ctr"/>
+            <a:endParaRPr/>
+          </a:p>
+        </p:txBody>
+      </p:sp>
+      <p:sp>
+        <p:nvSpPr>
+          <p:cNvPr id="76" name="PlaceHolder 2"/>
           <p:cNvSpPr>
             <a:spLocks noGrp="1"/>
           </p:cNvSpPr>
@@ -1442,7 +1455,7 @@
       </p:sp>
       <p:sp>
         <p:nvSpPr>
-          <p:cNvPr id="83" name="PlaceHolder 3"/>
+          <p:cNvPr id="77" name="PlaceHolder 3"/>
           <p:cNvSpPr>
             <a:spLocks noGrp="1"/>
           </p:cNvSpPr>
@@ -1468,7 +1481,7 @@
       </p:sp>
       <p:sp>
         <p:nvSpPr>
-          <p:cNvPr id="84" name="PlaceHolder 4"/>
+          <p:cNvPr id="78" name="PlaceHolder 4"/>
           <p:cNvSpPr>
             <a:spLocks noGrp="1"/>
           </p:cNvSpPr>
@@ -1494,7 +1507,7 @@
       </p:sp>
       <p:sp>
         <p:nvSpPr>
-          <p:cNvPr id="85" name="PlaceHolder 5"/>
+          <p:cNvPr id="79" name="PlaceHolder 5"/>
           <p:cNvSpPr>
             <a:spLocks noGrp="1"/>
           </p:cNvSpPr>
@@ -1542,7 +1555,7 @@
       </p:grpSpPr>
       <p:sp>
         <p:nvSpPr>
-          <p:cNvPr id="86" name="PlaceHolder 1"/>
+          <p:cNvPr id="80" name="PlaceHolder 1"/>
           <p:cNvSpPr>
             <a:spLocks noGrp="1"/>
           </p:cNvSpPr>
@@ -1562,13 +1575,14 @@
         <p:txBody>
           <a:bodyPr lIns="0" rIns="0" tIns="0" bIns="0" anchor="ctr"/>
           <a:p>
-            <a:endParaRPr/>
-          </a:p>
-        </p:txBody>
-      </p:sp>
-      <p:sp>
-        <p:nvSpPr>
-          <p:cNvPr id="87" name="PlaceHolder 2"/>
+            <a:pPr algn="ctr"/>
+            <a:endParaRPr/>
+          </a:p>
+        </p:txBody>
+      </p:sp>
+      <p:sp>
+        <p:nvSpPr>
+          <p:cNvPr id="81" name="PlaceHolder 2"/>
           <p:cNvSpPr>
             <a:spLocks noGrp="1"/>
           </p:cNvSpPr>
@@ -1594,7 +1608,7 @@
       </p:sp>
       <p:sp>
         <p:nvSpPr>
-          <p:cNvPr id="88" name="PlaceHolder 3"/>
+          <p:cNvPr id="82" name="PlaceHolder 3"/>
           <p:cNvSpPr>
             <a:spLocks noGrp="1"/>
           </p:cNvSpPr>
@@ -1620,7 +1634,7 @@
       </p:sp>
       <p:pic>
         <p:nvPicPr>
-          <p:cNvPr id="89" name="" descr=""/>
+          <p:cNvPr id="83" name="" descr=""/>
           <p:cNvPicPr/>
           <p:nvPr/>
         </p:nvPicPr>
@@ -1645,7 +1659,7 @@
       </p:pic>
       <p:pic>
         <p:nvPicPr>
-          <p:cNvPr id="90" name="" descr=""/>
+          <p:cNvPr id="84" name="" descr=""/>
           <p:cNvPicPr/>
           <p:nvPr/>
         </p:nvPicPr>
@@ -1692,7 +1706,7 @@
       </p:grpSpPr>
       <p:sp>
         <p:nvSpPr>
-          <p:cNvPr id="16" name="PlaceHolder 1"/>
+          <p:cNvPr id="13" name="PlaceHolder 1"/>
           <p:cNvSpPr>
             <a:spLocks noGrp="1"/>
           </p:cNvSpPr>
@@ -1712,13 +1726,14 @@
         <p:txBody>
           <a:bodyPr lIns="0" rIns="0" tIns="0" bIns="0" anchor="ctr"/>
           <a:p>
-            <a:endParaRPr/>
-          </a:p>
-        </p:txBody>
-      </p:sp>
-      <p:sp>
-        <p:nvSpPr>
-          <p:cNvPr id="17" name="PlaceHolder 2"/>
+            <a:pPr algn="ctr"/>
+            <a:endParaRPr/>
+          </a:p>
+        </p:txBody>
+      </p:sp>
+      <p:sp>
+        <p:nvSpPr>
+          <p:cNvPr id="14" name="PlaceHolder 2"/>
           <p:cNvSpPr>
             <a:spLocks noGrp="1"/>
           </p:cNvSpPr>
@@ -1766,7 +1781,7 @@
       </p:grpSpPr>
       <p:sp>
         <p:nvSpPr>
-          <p:cNvPr id="18" name="PlaceHolder 1"/>
+          <p:cNvPr id="15" name="PlaceHolder 1"/>
           <p:cNvSpPr>
             <a:spLocks noGrp="1"/>
           </p:cNvSpPr>
@@ -1786,13 +1801,14 @@
         <p:txBody>
           <a:bodyPr lIns="0" rIns="0" tIns="0" bIns="0" anchor="ctr"/>
           <a:p>
-            <a:endParaRPr/>
-          </a:p>
-        </p:txBody>
-      </p:sp>
-      <p:sp>
-        <p:nvSpPr>
-          <p:cNvPr id="19" name="PlaceHolder 2"/>
+            <a:pPr algn="ctr"/>
+            <a:endParaRPr/>
+          </a:p>
+        </p:txBody>
+      </p:sp>
+      <p:sp>
+        <p:nvSpPr>
+          <p:cNvPr id="16" name="PlaceHolder 2"/>
           <p:cNvSpPr>
             <a:spLocks noGrp="1"/>
           </p:cNvSpPr>
@@ -1818,7 +1834,7 @@
       </p:sp>
       <p:sp>
         <p:nvSpPr>
-          <p:cNvPr id="20" name="PlaceHolder 3"/>
+          <p:cNvPr id="17" name="PlaceHolder 3"/>
           <p:cNvSpPr>
             <a:spLocks noGrp="1"/>
           </p:cNvSpPr>
@@ -1866,7 +1882,7 @@
       </p:grpSpPr>
       <p:sp>
         <p:nvSpPr>
-          <p:cNvPr id="21" name="PlaceHolder 1"/>
+          <p:cNvPr id="18" name="PlaceHolder 1"/>
           <p:cNvSpPr>
             <a:spLocks noGrp="1"/>
           </p:cNvSpPr>
@@ -1886,6 +1902,7 @@
         <p:txBody>
           <a:bodyPr lIns="0" rIns="0" tIns="0" bIns="0" anchor="ctr"/>
           <a:p>
+            <a:pPr algn="ctr"/>
             <a:endParaRPr/>
           </a:p>
         </p:txBody>
@@ -1914,7 +1931,7 @@
       </p:grpSpPr>
       <p:sp>
         <p:nvSpPr>
-          <p:cNvPr id="22" name="PlaceHolder 1"/>
+          <p:cNvPr id="19" name="PlaceHolder 1"/>
           <p:cNvSpPr>
             <a:spLocks noGrp="1"/>
           </p:cNvSpPr>
@@ -1963,7 +1980,7 @@
       </p:grpSpPr>
       <p:sp>
         <p:nvSpPr>
-          <p:cNvPr id="23" name="PlaceHolder 1"/>
+          <p:cNvPr id="20" name="PlaceHolder 1"/>
           <p:cNvSpPr>
             <a:spLocks noGrp="1"/>
           </p:cNvSpPr>
@@ -1983,13 +2000,14 @@
         <p:txBody>
           <a:bodyPr lIns="0" rIns="0" tIns="0" bIns="0" anchor="ctr"/>
           <a:p>
-            <a:endParaRPr/>
-          </a:p>
-        </p:txBody>
-      </p:sp>
-      <p:sp>
-        <p:nvSpPr>
-          <p:cNvPr id="24" name="PlaceHolder 2"/>
+            <a:pPr algn="ctr"/>
+            <a:endParaRPr/>
+          </a:p>
+        </p:txBody>
+      </p:sp>
+      <p:sp>
+        <p:nvSpPr>
+          <p:cNvPr id="21" name="PlaceHolder 2"/>
           <p:cNvSpPr>
             <a:spLocks noGrp="1"/>
           </p:cNvSpPr>
@@ -2015,7 +2033,7 @@
       </p:sp>
       <p:sp>
         <p:nvSpPr>
-          <p:cNvPr id="25" name="PlaceHolder 3"/>
+          <p:cNvPr id="22" name="PlaceHolder 3"/>
           <p:cNvSpPr>
             <a:spLocks noGrp="1"/>
           </p:cNvSpPr>
@@ -2041,7 +2059,7 @@
       </p:sp>
       <p:sp>
         <p:nvSpPr>
-          <p:cNvPr id="26" name="PlaceHolder 4"/>
+          <p:cNvPr id="23" name="PlaceHolder 4"/>
           <p:cNvSpPr>
             <a:spLocks noGrp="1"/>
           </p:cNvSpPr>
@@ -2089,7 +2107,7 @@
       </p:grpSpPr>
       <p:sp>
         <p:nvSpPr>
-          <p:cNvPr id="27" name="PlaceHolder 1"/>
+          <p:cNvPr id="24" name="PlaceHolder 1"/>
           <p:cNvSpPr>
             <a:spLocks noGrp="1"/>
           </p:cNvSpPr>
@@ -2109,13 +2127,14 @@
         <p:txBody>
           <a:bodyPr lIns="0" rIns="0" tIns="0" bIns="0" anchor="ctr"/>
           <a:p>
-            <a:endParaRPr/>
-          </a:p>
-        </p:txBody>
-      </p:sp>
-      <p:sp>
-        <p:nvSpPr>
-          <p:cNvPr id="28" name="PlaceHolder 2"/>
+            <a:pPr algn="ctr"/>
+            <a:endParaRPr/>
+          </a:p>
+        </p:txBody>
+      </p:sp>
+      <p:sp>
+        <p:nvSpPr>
+          <p:cNvPr id="25" name="PlaceHolder 2"/>
           <p:cNvSpPr>
             <a:spLocks noGrp="1"/>
           </p:cNvSpPr>
@@ -2141,7 +2160,7 @@
       </p:sp>
       <p:sp>
         <p:nvSpPr>
-          <p:cNvPr id="29" name="PlaceHolder 3"/>
+          <p:cNvPr id="26" name="PlaceHolder 3"/>
           <p:cNvSpPr>
             <a:spLocks noGrp="1"/>
           </p:cNvSpPr>
@@ -2167,7 +2186,7 @@
       </p:sp>
       <p:sp>
         <p:nvSpPr>
-          <p:cNvPr id="30" name="PlaceHolder 4"/>
+          <p:cNvPr id="27" name="PlaceHolder 4"/>
           <p:cNvSpPr>
             <a:spLocks noGrp="1"/>
           </p:cNvSpPr>
@@ -2215,7 +2234,7 @@
       </p:grpSpPr>
       <p:sp>
         <p:nvSpPr>
-          <p:cNvPr id="31" name="PlaceHolder 1"/>
+          <p:cNvPr id="28" name="PlaceHolder 1"/>
           <p:cNvSpPr>
             <a:spLocks noGrp="1"/>
           </p:cNvSpPr>
@@ -2235,13 +2254,14 @@
         <p:txBody>
           <a:bodyPr lIns="0" rIns="0" tIns="0" bIns="0" anchor="ctr"/>
           <a:p>
-            <a:endParaRPr/>
-          </a:p>
-        </p:txBody>
-      </p:sp>
-      <p:sp>
-        <p:nvSpPr>
-          <p:cNvPr id="32" name="PlaceHolder 2"/>
+            <a:pPr algn="ctr"/>
+            <a:endParaRPr/>
+          </a:p>
+        </p:txBody>
+      </p:sp>
+      <p:sp>
+        <p:nvSpPr>
+          <p:cNvPr id="29" name="PlaceHolder 2"/>
           <p:cNvSpPr>
             <a:spLocks noGrp="1"/>
           </p:cNvSpPr>
@@ -2267,7 +2287,7 @@
       </p:sp>
       <p:sp>
         <p:nvSpPr>
-          <p:cNvPr id="33" name="PlaceHolder 3"/>
+          <p:cNvPr id="30" name="PlaceHolder 3"/>
           <p:cNvSpPr>
             <a:spLocks noGrp="1"/>
           </p:cNvSpPr>
@@ -2293,7 +2313,7 @@
       </p:sp>
       <p:sp>
         <p:nvSpPr>
-          <p:cNvPr id="34" name="PlaceHolder 4"/>
+          <p:cNvPr id="31" name="PlaceHolder 4"/>
           <p:cNvSpPr>
             <a:spLocks noGrp="1"/>
           </p:cNvSpPr>
@@ -2355,19 +2375,10 @@
         <p:spPr>
           <a:xfrm>
             <a:off x="550440" y="6553080"/>
-            <a:ext cx="5446440" cy="1014840"/>
-          </a:xfrm>
-          <a:prstGeom prst="rect">
-            <a:avLst>
-              <a:gd name="A1" fmla="val 0"/>
-              <a:gd name="A2" fmla="val 0"/>
-              <a:gd name="A3" fmla="val 0"/>
-              <a:gd name="A4" fmla="val 0"/>
-              <a:gd name="A5" fmla="val 0"/>
-              <a:gd name="A6" fmla="val 0"/>
-              <a:gd name="A7" fmla="val 0"/>
-              <a:gd name="A8" fmla="val 0"/>
-            </a:avLst>
+            <a:ext cx="5445720" cy="1014120"/>
+          </a:xfrm>
+          <a:prstGeom prst="rect">
+            <a:avLst/>
           </a:prstGeom>
           <a:solidFill>
             <a:srgbClr val="9fcbdc"/>
@@ -2386,19 +2397,10 @@
         <p:spPr>
           <a:xfrm>
             <a:off x="535320" y="6546600"/>
-            <a:ext cx="4068000" cy="1028520"/>
-          </a:xfrm>
-          <a:prstGeom prst="rect">
-            <a:avLst>
-              <a:gd name="A1" fmla="val 0"/>
-              <a:gd name="A2" fmla="val 0"/>
-              <a:gd name="A3" fmla="val 0"/>
-              <a:gd name="A4" fmla="val 0"/>
-              <a:gd name="A5" fmla="val 0"/>
-              <a:gd name="A6" fmla="val 0"/>
-              <a:gd name="A7" fmla="val 0"/>
-              <a:gd name="A8" fmla="val 0"/>
-            </a:avLst>
+            <a:ext cx="4067280" cy="1027800"/>
+          </a:xfrm>
+          <a:prstGeom prst="rect">
+            <a:avLst/>
           </a:prstGeom>
           <a:solidFill>
             <a:srgbClr val="000000"/>
@@ -2417,7 +2419,7 @@
         <p:spPr>
           <a:xfrm>
             <a:off x="-6840" y="6383880"/>
-            <a:ext cx="3750480" cy="1191240"/>
+            <a:ext cx="3749760" cy="1190520"/>
           </a:xfrm>
           <a:prstGeom prst="rtTriangle">
             <a:avLst/>
@@ -2462,7 +2464,7 @@
         <p:spPr>
           <a:xfrm>
             <a:off x="0" y="5141520"/>
-            <a:ext cx="10087920" cy="360"/>
+            <a:ext cx="10087200" cy="360"/>
           </a:xfrm>
           <a:prstGeom prst="rtTriangle">
             <a:avLst/>
@@ -2488,66 +2490,17 @@
       </p:sp>
       <p:sp>
         <p:nvSpPr>
-          <p:cNvPr id="5" name="PlaceHolder 6"/>
-          <p:cNvSpPr>
-            <a:spLocks noGrp="1"/>
-          </p:cNvSpPr>
-          <p:nvPr>
-            <p:ph type="title"/>
-          </p:nvPr>
-        </p:nvSpPr>
-        <p:spPr>
-          <a:xfrm>
-            <a:off x="756000" y="1931760"/>
-            <a:ext cx="8568000" cy="2016720"/>
-          </a:xfrm>
-          <a:prstGeom prst="rect">
-            <a:avLst/>
-          </a:prstGeom>
-        </p:spPr>
-        <p:txBody>
-          <a:bodyPr lIns="100800" rIns="100800" tIns="50400" bIns="50400" anchor="b"/>
-          <a:p>
-            <a:pPr algn="r">
-              <a:lnSpc>
-                <a:spcPct val="100000"/>
-              </a:lnSpc>
-            </a:pPr>
-            <a:r>
-              <a:rPr b="1" lang="en-US" sz="5300">
-                <a:solidFill>
-                  <a:srgbClr val="464646"/>
-                </a:solidFill>
-                <a:latin typeface="Lucida Sans Unicode"/>
-              </a:rPr>
-              <a:t>Click to edit the title text formatClick to edit Master title style</a:t>
-            </a:r>
-            <a:endParaRPr/>
-          </a:p>
-        </p:txBody>
-      </p:sp>
-      <p:sp>
-        <p:nvSpPr>
-          <p:cNvPr id="6" name="CustomShape 7"/>
+          <p:cNvPr id="5" name="CustomShape 6"/>
           <p:cNvSpPr/>
           <p:nvPr/>
         </p:nvSpPr>
         <p:spPr>
           <a:xfrm>
             <a:off x="1860480" y="5459760"/>
-            <a:ext cx="8219880" cy="537840"/>
-          </a:xfrm>
-          <a:prstGeom prst="rect">
-            <a:avLst>
-              <a:gd name="A1" fmla="val 0"/>
-              <a:gd name="A2" fmla="val 0"/>
-              <a:gd name="A3" fmla="val 0"/>
-              <a:gd name="A4" fmla="val 0"/>
-              <a:gd name="A5" fmla="val 0"/>
-              <a:gd name="A6" fmla="val 0"/>
-              <a:gd name="A7" fmla="val 0"/>
-              <a:gd name="A8" fmla="val 0"/>
-            </a:avLst>
+            <a:ext cx="8219160" cy="537120"/>
+          </a:xfrm>
+          <a:prstGeom prst="rect">
+            <a:avLst/>
           </a:prstGeom>
           <a:solidFill>
             <a:srgbClr val="9fcbdc"/>
@@ -2559,26 +2512,17 @@
       </p:sp>
       <p:sp>
         <p:nvSpPr>
-          <p:cNvPr id="7" name="CustomShape 8"/>
+          <p:cNvPr id="6" name="CustomShape 7"/>
           <p:cNvSpPr/>
           <p:nvPr/>
         </p:nvSpPr>
         <p:spPr>
           <a:xfrm>
             <a:off x="39240" y="5773680"/>
-            <a:ext cx="10041120" cy="869040"/>
-          </a:xfrm>
-          <a:prstGeom prst="rect">
-            <a:avLst>
-              <a:gd name="A1" fmla="val 0"/>
-              <a:gd name="A2" fmla="val 0"/>
-              <a:gd name="A3" fmla="val 0"/>
-              <a:gd name="A4" fmla="val 0"/>
-              <a:gd name="A5" fmla="val 0"/>
-              <a:gd name="A6" fmla="val 0"/>
-              <a:gd name="A7" fmla="val 0"/>
-              <a:gd name="A8" fmla="val 0"/>
-            </a:avLst>
+            <a:ext cx="10040400" cy="868320"/>
+          </a:xfrm>
+          <a:prstGeom prst="rect">
+            <a:avLst/>
           </a:prstGeom>
           <a:solidFill>
             <a:srgbClr val="000000"/>
@@ -2590,26 +2534,17 @@
       </p:sp>
       <p:sp>
         <p:nvSpPr>
-          <p:cNvPr id="8" name="CustomShape 9"/>
+          <p:cNvPr id="7" name="CustomShape 8"/>
           <p:cNvSpPr/>
           <p:nvPr/>
         </p:nvSpPr>
         <p:spPr>
           <a:xfrm>
             <a:off x="0" y="5512680"/>
-            <a:ext cx="10080360" cy="2054520"/>
-          </a:xfrm>
-          <a:prstGeom prst="rect">
-            <a:avLst>
-              <a:gd name="A1" fmla="val 0"/>
-              <a:gd name="A2" fmla="val 0"/>
-              <a:gd name="A3" fmla="val 0"/>
-              <a:gd name="A4" fmla="val 0"/>
-              <a:gd name="A5" fmla="val 0"/>
-              <a:gd name="A6" fmla="val 0"/>
-              <a:gd name="A7" fmla="val 0"/>
-              <a:gd name="A8" fmla="val 0"/>
-            </a:avLst>
+            <a:ext cx="10079640" cy="2053800"/>
+          </a:xfrm>
+          <a:prstGeom prst="rect">
+            <a:avLst/>
           </a:prstGeom>
           <a:blipFill>
             <a:blip r:embed="rId3"/>
@@ -2622,7 +2557,7 @@
       </p:sp>
       <p:sp>
         <p:nvSpPr>
-          <p:cNvPr id="9" name="Line 10"/>
+          <p:cNvPr id="8" name="Line 9"/>
           <p:cNvSpPr/>
           <p:nvPr/>
         </p:nvSpPr>
@@ -2644,110 +2579,50 @@
       </p:sp>
       <p:sp>
         <p:nvSpPr>
+          <p:cNvPr id="9" name="PlaceHolder 10"/>
+          <p:cNvSpPr>
+            <a:spLocks noGrp="1"/>
+          </p:cNvSpPr>
+          <p:nvPr>
+            <p:ph type="title"/>
+          </p:nvPr>
+        </p:nvSpPr>
+        <p:spPr>
+          <a:xfrm>
+            <a:off x="504000" y="301320"/>
+            <a:ext cx="9071640" cy="1261800"/>
+          </a:xfrm>
+          <a:prstGeom prst="rect">
+            <a:avLst/>
+          </a:prstGeom>
+        </p:spPr>
+        <p:txBody>
+          <a:bodyPr lIns="0" rIns="0" tIns="0" bIns="0" anchor="ctr"/>
+          <a:p>
+            <a:r>
+              <a:rPr lang="en-US">
+                <a:latin typeface="Arial"/>
+              </a:rPr>
+              <a:t>Click to edit the title text format</a:t>
+            </a:r>
+            <a:endParaRPr/>
+          </a:p>
+        </p:txBody>
+      </p:sp>
+      <p:sp>
+        <p:nvSpPr>
           <p:cNvPr id="10" name="PlaceHolder 11"/>
           <p:cNvSpPr>
             <a:spLocks noGrp="1"/>
           </p:cNvSpPr>
           <p:nvPr>
-            <p:ph type="dt"/>
-          </p:nvPr>
-        </p:nvSpPr>
-        <p:spPr>
-          <a:xfrm>
-            <a:off x="7416000" y="7063560"/>
-            <a:ext cx="2116440" cy="402840"/>
-          </a:xfrm>
-          <a:prstGeom prst="rect">
-            <a:avLst/>
-          </a:prstGeom>
-        </p:spPr>
-        <p:txBody>
-          <a:bodyPr lIns="100800" rIns="100800" tIns="50400" bIns="50400" anchor="b"/>
-          <a:p>
-            <a:endParaRPr/>
-          </a:p>
-        </p:txBody>
-      </p:sp>
-      <p:sp>
-        <p:nvSpPr>
-          <p:cNvPr id="11" name="PlaceHolder 12"/>
-          <p:cNvSpPr>
-            <a:spLocks noGrp="1"/>
-          </p:cNvSpPr>
-          <p:nvPr>
-            <p:ph type="ftr"/>
-          </p:nvPr>
-        </p:nvSpPr>
-        <p:spPr>
-          <a:xfrm>
-            <a:off x="4828680" y="7063560"/>
-            <a:ext cx="2591280" cy="402120"/>
-          </a:xfrm>
-          <a:prstGeom prst="rect">
-            <a:avLst/>
-          </a:prstGeom>
-        </p:spPr>
-        <p:txBody>
-          <a:bodyPr lIns="100800" rIns="100800" tIns="50400" bIns="50400" anchor="b"/>
-          <a:p>
-            <a:endParaRPr/>
-          </a:p>
-        </p:txBody>
-      </p:sp>
-      <p:sp>
-        <p:nvSpPr>
-          <p:cNvPr id="12" name="PlaceHolder 13"/>
-          <p:cNvSpPr>
-            <a:spLocks noGrp="1"/>
-          </p:cNvSpPr>
-          <p:nvPr>
-            <p:ph type="sldNum"/>
-          </p:nvPr>
-        </p:nvSpPr>
-        <p:spPr>
-          <a:xfrm>
-            <a:off x="9533160" y="7063560"/>
-            <a:ext cx="402840" cy="402120"/>
-          </a:xfrm>
-          <a:prstGeom prst="rect">
-            <a:avLst/>
-          </a:prstGeom>
-        </p:spPr>
-        <p:txBody>
-          <a:bodyPr lIns="100800" rIns="100800" tIns="50400" bIns="50400" anchor="b"/>
-          <a:p>
-            <a:pPr>
-              <a:lnSpc>
-                <a:spcPct val="100000"/>
-              </a:lnSpc>
-            </a:pPr>
-            <a:fld id="{90ABBBE6-C807-41F5-877D-A1A2736C119E}" type="slidenum">
-              <a:rPr lang="en-US" sz="1100">
-                <a:solidFill>
-                  <a:srgbClr val="ffffff"/>
-                </a:solidFill>
-                <a:latin typeface="Lucida Sans Unicode"/>
-              </a:rPr>
-              <a:t>&lt;number&gt;</a:t>
-            </a:fld>
-            <a:endParaRPr/>
-          </a:p>
-        </p:txBody>
-      </p:sp>
-      <p:sp>
-        <p:nvSpPr>
-          <p:cNvPr id="13" name="PlaceHolder 14"/>
-          <p:cNvSpPr>
-            <a:spLocks noGrp="1"/>
-          </p:cNvSpPr>
-          <p:nvPr>
             <p:ph type="body"/>
           </p:nvPr>
         </p:nvSpPr>
         <p:spPr>
           <a:xfrm>
             <a:off x="504000" y="1768680"/>
-            <a:ext cx="9072000" cy="4384080"/>
+            <a:ext cx="9071640" cy="4383720"/>
           </a:xfrm>
           <a:prstGeom prst="rect">
             <a:avLst/>
@@ -2762,8 +2637,8 @@
               <a:buChar char=""/>
             </a:pPr>
             <a:r>
-              <a:rPr lang="en-US" sz="3000">
-                <a:latin typeface="Lucida Sans Unicode"/>
+              <a:rPr lang="en-US">
+                <a:latin typeface="Arial"/>
               </a:rPr>
               <a:t>Click to edit the outline text format</a:t>
             </a:r>
@@ -2776,8 +2651,8 @@
               <a:buChar char=""/>
             </a:pPr>
             <a:r>
-              <a:rPr lang="en-US" sz="2300">
-                <a:latin typeface="Lucida Sans Unicode"/>
+              <a:rPr lang="en-US">
+                <a:latin typeface="Arial"/>
               </a:rPr>
               <a:t>Second Outline Level</a:t>
             </a:r>
@@ -2790,8 +2665,8 @@
               <a:buChar char=""/>
             </a:pPr>
             <a:r>
-              <a:rPr lang="en-US" sz="2100">
-                <a:latin typeface="Lucida Sans Unicode"/>
+              <a:rPr lang="en-US">
+                <a:latin typeface="Arial"/>
               </a:rPr>
               <a:t>Third Outline Level</a:t>
             </a:r>
@@ -2804,8 +2679,8 @@
               <a:buChar char=""/>
             </a:pPr>
             <a:r>
-              <a:rPr lang="en-US" sz="2000">
-                <a:latin typeface="Lucida Sans Unicode"/>
+              <a:rPr lang="en-US">
+                <a:latin typeface="Arial"/>
               </a:rPr>
               <a:t>Fourth Outline Level</a:t>
             </a:r>
@@ -2818,8 +2693,8 @@
               <a:buChar char=""/>
             </a:pPr>
             <a:r>
-              <a:rPr lang="en-US" sz="2000">
-                <a:latin typeface="Lucida Sans Unicode"/>
+              <a:rPr lang="en-US">
+                <a:latin typeface="Arial"/>
               </a:rPr>
               <a:t>Fifth Outline Level</a:t>
             </a:r>
@@ -2832,8 +2707,8 @@
               <a:buChar char=""/>
             </a:pPr>
             <a:r>
-              <a:rPr lang="en-US" sz="2000">
-                <a:latin typeface="Lucida Sans Unicode"/>
+              <a:rPr lang="en-US">
+                <a:latin typeface="Arial"/>
               </a:rPr>
               <a:t>Sixth Outline Level</a:t>
             </a:r>
@@ -2846,8 +2721,8 @@
               <a:buChar char=""/>
             </a:pPr>
             <a:r>
-              <a:rPr lang="en-US" sz="2000">
-                <a:latin typeface="Lucida Sans Unicode"/>
+              <a:rPr lang="en-US">
+                <a:latin typeface="Arial"/>
               </a:rPr>
               <a:t>Seventh Outline Level</a:t>
             </a:r>
@@ -2901,26 +2776,17 @@
       </p:grpSpPr>
       <p:sp>
         <p:nvSpPr>
-          <p:cNvPr id="48" name="CustomShape 1"/>
+          <p:cNvPr id="45" name="CustomShape 1"/>
           <p:cNvSpPr/>
           <p:nvPr/>
         </p:nvSpPr>
         <p:spPr>
           <a:xfrm>
             <a:off x="550440" y="6553080"/>
-            <a:ext cx="5446440" cy="1014840"/>
-          </a:xfrm>
-          <a:prstGeom prst="rect">
-            <a:avLst>
-              <a:gd name="A1" fmla="val 0"/>
-              <a:gd name="A2" fmla="val 0"/>
-              <a:gd name="A3" fmla="val 0"/>
-              <a:gd name="A4" fmla="val 0"/>
-              <a:gd name="A5" fmla="val 0"/>
-              <a:gd name="A6" fmla="val 0"/>
-              <a:gd name="A7" fmla="val 0"/>
-              <a:gd name="A8" fmla="val 0"/>
-            </a:avLst>
+            <a:ext cx="5445720" cy="1014120"/>
+          </a:xfrm>
+          <a:prstGeom prst="rect">
+            <a:avLst/>
           </a:prstGeom>
           <a:solidFill>
             <a:srgbClr val="9fcbdc"/>
@@ -2932,26 +2798,17 @@
       </p:sp>
       <p:sp>
         <p:nvSpPr>
-          <p:cNvPr id="49" name="CustomShape 2"/>
+          <p:cNvPr id="46" name="CustomShape 2"/>
           <p:cNvSpPr/>
           <p:nvPr/>
         </p:nvSpPr>
         <p:spPr>
           <a:xfrm>
             <a:off x="535320" y="6546600"/>
-            <a:ext cx="4068000" cy="1028520"/>
-          </a:xfrm>
-          <a:prstGeom prst="rect">
-            <a:avLst>
-              <a:gd name="A1" fmla="val 0"/>
-              <a:gd name="A2" fmla="val 0"/>
-              <a:gd name="A3" fmla="val 0"/>
-              <a:gd name="A4" fmla="val 0"/>
-              <a:gd name="A5" fmla="val 0"/>
-              <a:gd name="A6" fmla="val 0"/>
-              <a:gd name="A7" fmla="val 0"/>
-              <a:gd name="A8" fmla="val 0"/>
-            </a:avLst>
+            <a:ext cx="4067280" cy="1027800"/>
+          </a:xfrm>
+          <a:prstGeom prst="rect">
+            <a:avLst/>
           </a:prstGeom>
           <a:solidFill>
             <a:srgbClr val="000000"/>
@@ -2963,14 +2820,14 @@
       </p:sp>
       <p:sp>
         <p:nvSpPr>
-          <p:cNvPr id="50" name="CustomShape 3"/>
+          <p:cNvPr id="47" name="CustomShape 3"/>
           <p:cNvSpPr/>
           <p:nvPr/>
         </p:nvSpPr>
         <p:spPr>
           <a:xfrm>
             <a:off x="-6840" y="6383880"/>
-            <a:ext cx="3750480" cy="1191240"/>
+            <a:ext cx="3749760" cy="1190520"/>
           </a:xfrm>
           <a:prstGeom prst="rtTriangle">
             <a:avLst/>
@@ -2986,7 +2843,7 @@
       </p:sp>
       <p:sp>
         <p:nvSpPr>
-          <p:cNvPr id="51" name="Line 4"/>
+          <p:cNvPr id="48" name="Line 4"/>
           <p:cNvSpPr/>
           <p:nvPr/>
         </p:nvSpPr>
@@ -3008,99 +2865,7 @@
       </p:sp>
       <p:sp>
         <p:nvSpPr>
-          <p:cNvPr id="52" name="PlaceHolder 5"/>
-          <p:cNvSpPr>
-            <a:spLocks noGrp="1"/>
-          </p:cNvSpPr>
-          <p:nvPr>
-            <p:ph type="dt"/>
-          </p:nvPr>
-        </p:nvSpPr>
-        <p:spPr>
-          <a:xfrm>
-            <a:off x="7416000" y="7063560"/>
-            <a:ext cx="2116440" cy="402840"/>
-          </a:xfrm>
-          <a:prstGeom prst="rect">
-            <a:avLst/>
-          </a:prstGeom>
-        </p:spPr>
-        <p:txBody>
-          <a:bodyPr lIns="100800" rIns="100800" tIns="50400" bIns="50400" anchor="b"/>
-          <a:p>
-            <a:endParaRPr/>
-          </a:p>
-        </p:txBody>
-      </p:sp>
-      <p:sp>
-        <p:nvSpPr>
-          <p:cNvPr id="53" name="PlaceHolder 6"/>
-          <p:cNvSpPr>
-            <a:spLocks noGrp="1"/>
-          </p:cNvSpPr>
-          <p:nvPr>
-            <p:ph type="ftr"/>
-          </p:nvPr>
-        </p:nvSpPr>
-        <p:spPr>
-          <a:xfrm>
-            <a:off x="4828680" y="7063560"/>
-            <a:ext cx="2591280" cy="402120"/>
-          </a:xfrm>
-          <a:prstGeom prst="rect">
-            <a:avLst/>
-          </a:prstGeom>
-        </p:spPr>
-        <p:txBody>
-          <a:bodyPr lIns="100800" rIns="100800" tIns="50400" bIns="50400" anchor="b"/>
-          <a:p>
-            <a:endParaRPr/>
-          </a:p>
-        </p:txBody>
-      </p:sp>
-      <p:sp>
-        <p:nvSpPr>
-          <p:cNvPr id="54" name="PlaceHolder 7"/>
-          <p:cNvSpPr>
-            <a:spLocks noGrp="1"/>
-          </p:cNvSpPr>
-          <p:nvPr>
-            <p:ph type="sldNum"/>
-          </p:nvPr>
-        </p:nvSpPr>
-        <p:spPr>
-          <a:xfrm>
-            <a:off x="9533160" y="7063560"/>
-            <a:ext cx="402840" cy="402120"/>
-          </a:xfrm>
-          <a:prstGeom prst="rect">
-            <a:avLst/>
-          </a:prstGeom>
-        </p:spPr>
-        <p:txBody>
-          <a:bodyPr lIns="100800" rIns="100800" tIns="50400" bIns="50400" anchor="b"/>
-          <a:p>
-            <a:pPr>
-              <a:lnSpc>
-                <a:spcPct val="100000"/>
-              </a:lnSpc>
-            </a:pPr>
-            <a:fld id="{85A62C0C-5A44-454D-90B9-F01BDC663B21}" type="slidenum">
-              <a:rPr lang="en-US" sz="1100">
-                <a:solidFill>
-                  <a:srgbClr val="000000"/>
-                </a:solidFill>
-                <a:latin typeface="Lucida Sans Unicode"/>
-              </a:rPr>
-              <a:t>&lt;number&gt;</a:t>
-            </a:fld>
-            <a:endParaRPr/>
-          </a:p>
-        </p:txBody>
-      </p:sp>
-      <p:sp>
-        <p:nvSpPr>
-          <p:cNvPr id="55" name="PlaceHolder 8"/>
+          <p:cNvPr id="49" name="PlaceHolder 5"/>
           <p:cNvSpPr>
             <a:spLocks noGrp="1"/>
           </p:cNvSpPr>
@@ -3120,9 +2885,10 @@
         <p:txBody>
           <a:bodyPr lIns="0" rIns="0" tIns="0" bIns="0" anchor="ctr"/>
           <a:p>
-            <a:r>
-              <a:rPr lang="en-US">
-                <a:latin typeface="Lucida Sans Unicode"/>
+            <a:pPr algn="ctr"/>
+            <a:r>
+              <a:rPr lang="en-US" sz="4400">
+                <a:latin typeface="Arial"/>
               </a:rPr>
               <a:t>Click to edit the title text format</a:t>
             </a:r>
@@ -3132,7 +2898,7 @@
       </p:sp>
       <p:sp>
         <p:nvSpPr>
-          <p:cNvPr id="56" name="PlaceHolder 9"/>
+          <p:cNvPr id="50" name="PlaceHolder 6"/>
           <p:cNvSpPr>
             <a:spLocks noGrp="1"/>
           </p:cNvSpPr>
@@ -3158,8 +2924,8 @@
               <a:buChar char=""/>
             </a:pPr>
             <a:r>
-              <a:rPr lang="en-US" sz="3000">
-                <a:latin typeface="Lucida Sans Unicode"/>
+              <a:rPr lang="en-US" sz="3200">
+                <a:latin typeface="Arial"/>
               </a:rPr>
               <a:t>Click to edit the outline text format</a:t>
             </a:r>
@@ -3172,8 +2938,8 @@
               <a:buChar char=""/>
             </a:pPr>
             <a:r>
-              <a:rPr lang="en-US" sz="2300">
-                <a:latin typeface="Lucida Sans Unicode"/>
+              <a:rPr lang="en-US" sz="2800">
+                <a:latin typeface="Arial"/>
               </a:rPr>
               <a:t>Second Outline Level</a:t>
             </a:r>
@@ -3186,8 +2952,8 @@
               <a:buChar char=""/>
             </a:pPr>
             <a:r>
-              <a:rPr lang="en-US" sz="2100">
-                <a:latin typeface="Lucida Sans Unicode"/>
+              <a:rPr lang="en-US" sz="2400">
+                <a:latin typeface="Arial"/>
               </a:rPr>
               <a:t>Third Outline Level</a:t>
             </a:r>
@@ -3201,7 +2967,7 @@
             </a:pPr>
             <a:r>
               <a:rPr lang="en-US" sz="2000">
-                <a:latin typeface="Lucida Sans Unicode"/>
+                <a:latin typeface="Arial"/>
               </a:rPr>
               <a:t>Fourth Outline Level</a:t>
             </a:r>
@@ -3215,7 +2981,7 @@
             </a:pPr>
             <a:r>
               <a:rPr lang="en-US" sz="2000">
-                <a:latin typeface="Lucida Sans Unicode"/>
+                <a:latin typeface="Arial"/>
               </a:rPr>
               <a:t>Fifth Outline Level</a:t>
             </a:r>
@@ -3229,7 +2995,7 @@
             </a:pPr>
             <a:r>
               <a:rPr lang="en-US" sz="2000">
-                <a:latin typeface="Lucida Sans Unicode"/>
+                <a:latin typeface="Arial"/>
               </a:rPr>
               <a:t>Sixth Outline Level</a:t>
             </a:r>
@@ -3243,7 +3009,7 @@
             </a:pPr>
             <a:r>
               <a:rPr lang="en-US" sz="2000">
-                <a:latin typeface="Lucida Sans Unicode"/>
+                <a:latin typeface="Arial"/>
               </a:rPr>
               <a:t>Seventh Outline Level</a:t>
             </a:r>
@@ -3290,27 +3056,27 @@
       </p:grpSpPr>
       <p:sp>
         <p:nvSpPr>
-          <p:cNvPr id="91" name="TextShape 1"/>
-          <p:cNvSpPr txBox="1"/>
+          <p:cNvPr id="85" name="CustomShape 1"/>
+          <p:cNvSpPr/>
           <p:nvPr/>
         </p:nvSpPr>
         <p:spPr>
           <a:xfrm>
             <a:off x="392040" y="655560"/>
-            <a:ext cx="9524520" cy="2016720"/>
-          </a:xfrm>
-          <a:prstGeom prst="rect">
-            <a:avLst/>
-          </a:prstGeom>
+            <a:ext cx="9523800" cy="2016000"/>
+          </a:xfrm>
+          <a:prstGeom prst="rect">
+            <a:avLst/>
+          </a:prstGeom>
+          <a:noFill/>
+          <a:ln>
+            <a:noFill/>
+          </a:ln>
         </p:spPr>
         <p:txBody>
           <a:bodyPr lIns="100800" rIns="100800" tIns="50400" bIns="50400" anchor="b"/>
           <a:p>
-            <a:pPr algn="r">
-              <a:lnSpc>
-                <a:spcPct val="100000"/>
-              </a:lnSpc>
-            </a:pPr>
+            <a:pPr algn="r"/>
             <a:r>
               <a:rPr b="1" lang="en-US" sz="5300">
                 <a:solidFill>
@@ -3320,6 +3086,14 @@
               </a:rPr>
               <a:t>Temps-Réel et </a:t>
             </a:r>
+            <a:endParaRPr/>
+          </a:p>
+          <a:p>
+            <a:pPr algn="r">
+              <a:lnSpc>
+                <a:spcPct val="100000"/>
+              </a:lnSpc>
+            </a:pPr>
             <a:r>
               <a:rPr b="1" lang="en-US" sz="5300">
                 <a:solidFill>
@@ -3327,16 +3101,6 @@
                 </a:solidFill>
                 <a:latin typeface="Lucida Sans Unicode"/>
               </a:rPr>
-              <a:t>
-</a:t>
-            </a:r>
-            <a:r>
-              <a:rPr b="1" lang="en-US" sz="5300">
-                <a:solidFill>
-                  <a:srgbClr val="464646"/>
-                </a:solidFill>
-                <a:latin typeface="Lucida Sans Unicode"/>
-              </a:rPr>
               <a:t>Multi-coeurs</a:t>
             </a:r>
             <a:endParaRPr/>
@@ -3345,18 +3109,22 @@
       </p:sp>
       <p:sp>
         <p:nvSpPr>
-          <p:cNvPr id="92" name="TextShape 2"/>
-          <p:cNvSpPr txBox="1"/>
+          <p:cNvPr id="86" name="CustomShape 2"/>
+          <p:cNvSpPr/>
           <p:nvPr/>
         </p:nvSpPr>
         <p:spPr>
           <a:xfrm>
             <a:off x="773280" y="3094200"/>
-            <a:ext cx="9219960" cy="2133360"/>
-          </a:xfrm>
-          <a:prstGeom prst="rect">
-            <a:avLst/>
-          </a:prstGeom>
+            <a:ext cx="9219240" cy="2132640"/>
+          </a:xfrm>
+          <a:prstGeom prst="rect">
+            <a:avLst/>
+          </a:prstGeom>
+          <a:noFill/>
+          <a:ln>
+            <a:noFill/>
+          </a:ln>
         </p:spPr>
         <p:txBody>
           <a:bodyPr lIns="50400" rIns="50400" tIns="50400" bIns="50400"/>
@@ -3439,7 +3207,7 @@
       </p:sp>
       <p:pic>
         <p:nvPicPr>
-          <p:cNvPr id="93" name="Picture 3" descr=""/>
+          <p:cNvPr id="87" name="Picture 3" descr=""/>
           <p:cNvPicPr/>
           <p:nvPr/>
         </p:nvPicPr>
@@ -3452,7 +3220,7 @@
         <p:spPr>
           <a:xfrm>
             <a:off x="7250040" y="3932280"/>
-            <a:ext cx="2666520" cy="1366560"/>
+            <a:ext cx="2665800" cy="1365840"/>
           </a:xfrm>
           <a:prstGeom prst="rect">
             <a:avLst/>
@@ -3516,27 +3284,26 @@
       </p:grpSpPr>
       <p:sp>
         <p:nvSpPr>
-          <p:cNvPr id="115" name="TextShape 1"/>
-          <p:cNvSpPr txBox="1"/>
+          <p:cNvPr id="109" name="CustomShape 1"/>
+          <p:cNvSpPr/>
           <p:nvPr/>
         </p:nvSpPr>
         <p:spPr>
           <a:xfrm>
             <a:off x="239760" y="205200"/>
-            <a:ext cx="9072360" cy="1472760"/>
-          </a:xfrm>
-          <a:prstGeom prst="rect">
-            <a:avLst/>
-          </a:prstGeom>
+            <a:ext cx="9071640" cy="1472040"/>
+          </a:xfrm>
+          <a:prstGeom prst="rect">
+            <a:avLst/>
+          </a:prstGeom>
+          <a:noFill/>
+          <a:ln>
+            <a:noFill/>
+          </a:ln>
         </p:spPr>
         <p:txBody>
           <a:bodyPr lIns="100800" rIns="100800" tIns="50400" bIns="50400" anchor="ctr"/>
           <a:p>
-            <a:pPr>
-              <a:lnSpc>
-                <a:spcPct val="100000"/>
-              </a:lnSpc>
-            </a:pPr>
             <a:r>
               <a:rPr b="1" lang="en-US" sz="4500">
                 <a:solidFill>
@@ -3546,6 +3313,14 @@
               </a:rPr>
               <a:t>Mécanisme d'arrêt: </a:t>
             </a:r>
+            <a:endParaRPr/>
+          </a:p>
+          <a:p>
+            <a:pPr>
+              <a:lnSpc>
+                <a:spcPct val="100000"/>
+              </a:lnSpc>
+            </a:pPr>
             <a:r>
               <a:rPr b="1" lang="en-US" sz="4500">
                 <a:solidFill>
@@ -3553,16 +3328,6 @@
                 </a:solidFill>
                 <a:latin typeface="Lucida Sans Unicode"/>
               </a:rPr>
-              <a:t>
-</a:t>
-            </a:r>
-            <a:r>
-              <a:rPr b="1" lang="en-US" sz="4500">
-                <a:solidFill>
-                  <a:srgbClr val="464646"/>
-                </a:solidFill>
-                <a:latin typeface="Lucida Sans Unicode"/>
-              </a:rPr>
               <a:t>solution en mode user</a:t>
             </a:r>
             <a:endParaRPr/>
@@ -3571,7 +3336,7 @@
       </p:sp>
       <p:pic>
         <p:nvPicPr>
-          <p:cNvPr id="116" name="Picture Placeholder 2" descr=""/>
+          <p:cNvPr id="110" name="Picture Placeholder 2" descr=""/>
           <p:cNvPicPr/>
           <p:nvPr/>
         </p:nvPicPr>
@@ -3584,7 +3349,7 @@
         <p:spPr>
           <a:xfrm>
             <a:off x="3840480" y="1676880"/>
-            <a:ext cx="6179040" cy="5546880"/>
+            <a:ext cx="6178320" cy="5546160"/>
           </a:xfrm>
           <a:prstGeom prst="rect">
             <a:avLst/>
@@ -3596,18 +3361,22 @@
       </p:pic>
       <p:sp>
         <p:nvSpPr>
-          <p:cNvPr id="117" name="TextShape 2"/>
-          <p:cNvSpPr txBox="1"/>
+          <p:cNvPr id="111" name="CustomShape 2"/>
+          <p:cNvSpPr/>
           <p:nvPr/>
         </p:nvSpPr>
         <p:spPr>
           <a:xfrm>
             <a:off x="254520" y="1924920"/>
-            <a:ext cx="4317480" cy="5115960"/>
-          </a:xfrm>
-          <a:prstGeom prst="rect">
-            <a:avLst/>
-          </a:prstGeom>
+            <a:ext cx="4316760" cy="5115240"/>
+          </a:xfrm>
+          <a:prstGeom prst="rect">
+            <a:avLst/>
+          </a:prstGeom>
+          <a:noFill/>
+          <a:ln>
+            <a:noFill/>
+          </a:ln>
         </p:spPr>
         <p:txBody>
           <a:bodyPr lIns="100800" rIns="100800" tIns="50400" bIns="50400"/>
@@ -3618,7 +3387,7 @@
               </a:lnSpc>
               <a:buSzPct val="45000"/>
               <a:buFont typeface="StarSymbol"/>
-              <a:buChar char=""/>
+              <a:buChar char="l"/>
             </a:pPr>
             <a:r>
               <a:rPr lang="en-US" sz="2800">
@@ -3639,7 +3408,7 @@
               </a:lnSpc>
               <a:buSzPct val="45000"/>
               <a:buFont typeface="StarSymbol"/>
-              <a:buChar char=""/>
+              <a:buChar char="l"/>
             </a:pPr>
             <a:r>
               <a:rPr lang="en-US" sz="2800">
@@ -3733,18 +3502,22 @@
       </p:grpSpPr>
       <p:sp>
         <p:nvSpPr>
-          <p:cNvPr id="118" name="TextShape 1"/>
-          <p:cNvSpPr txBox="1"/>
+          <p:cNvPr id="112" name="CustomShape 1"/>
+          <p:cNvSpPr/>
           <p:nvPr/>
         </p:nvSpPr>
         <p:spPr>
           <a:xfrm>
             <a:off x="316080" y="246240"/>
-            <a:ext cx="9072360" cy="1362960"/>
-          </a:xfrm>
-          <a:prstGeom prst="rect">
-            <a:avLst/>
-          </a:prstGeom>
+            <a:ext cx="9071640" cy="1362240"/>
+          </a:xfrm>
+          <a:prstGeom prst="rect">
+            <a:avLst/>
+          </a:prstGeom>
+          <a:noFill/>
+          <a:ln>
+            <a:noFill/>
+          </a:ln>
         </p:spPr>
         <p:txBody>
           <a:bodyPr lIns="100800" rIns="100800" tIns="50400" bIns="50400" anchor="ctr"/>
@@ -3769,18 +3542,22 @@
       </p:sp>
       <p:sp>
         <p:nvSpPr>
-          <p:cNvPr id="119" name="TextShape 2"/>
-          <p:cNvSpPr txBox="1"/>
+          <p:cNvPr id="113" name="CustomShape 2"/>
+          <p:cNvSpPr/>
           <p:nvPr/>
         </p:nvSpPr>
         <p:spPr>
           <a:xfrm>
             <a:off x="316080" y="2941560"/>
-            <a:ext cx="9072360" cy="4384440"/>
-          </a:xfrm>
-          <a:prstGeom prst="rect">
-            <a:avLst/>
-          </a:prstGeom>
+            <a:ext cx="9071640" cy="4383720"/>
+          </a:xfrm>
+          <a:prstGeom prst="rect">
+            <a:avLst/>
+          </a:prstGeom>
+          <a:noFill/>
+          <a:ln>
+            <a:noFill/>
+          </a:ln>
         </p:spPr>
         <p:txBody>
           <a:bodyPr lIns="100800" rIns="100800" tIns="50400" bIns="50400"/>
@@ -3791,7 +3568,7 @@
               </a:lnSpc>
               <a:buSzPct val="45000"/>
               <a:buFont typeface="StarSymbol"/>
-              <a:buChar char=""/>
+              <a:buChar char="l"/>
             </a:pPr>
             <a:r>
               <a:rPr lang="en-US" sz="2800">
@@ -3812,7 +3589,7 @@
               </a:lnSpc>
               <a:buSzPct val="45000"/>
               <a:buFont typeface="StarSymbol"/>
-              <a:buChar char=""/>
+              <a:buChar char="l"/>
             </a:pPr>
             <a:r>
               <a:rPr lang="en-US" sz="2800">
@@ -3828,9 +3605,12 @@
           </a:p>
           <a:p>
             <a:pPr lvl="1">
+              <a:lnSpc>
+                <a:spcPct val="100000"/>
+              </a:lnSpc>
               <a:buSzPct val="75000"/>
               <a:buFont typeface="StarSymbol"/>
-              <a:buChar char=""/>
+              <a:buChar char="l"/>
             </a:pPr>
             <a:r>
               <a:rPr lang="en-US" sz="2800">
@@ -3846,9 +3626,12 @@
           </a:p>
           <a:p>
             <a:pPr lvl="1">
+              <a:lnSpc>
+                <a:spcPct val="100000"/>
+              </a:lnSpc>
               <a:buSzPct val="75000"/>
               <a:buFont typeface="StarSymbol"/>
-              <a:buChar char=""/>
+              <a:buChar char="l"/>
             </a:pPr>
             <a:r>
               <a:rPr lang="en-US" sz="2800">
@@ -3864,9 +3647,12 @@
           </a:p>
           <a:p>
             <a:pPr lvl="1">
+              <a:lnSpc>
+                <a:spcPct val="100000"/>
+              </a:lnSpc>
               <a:buSzPct val="75000"/>
               <a:buFont typeface="StarSymbol"/>
-              <a:buChar char=""/>
+              <a:buChar char="l"/>
             </a:pPr>
             <a:r>
               <a:rPr lang="en-US" sz="2800">
@@ -3936,18 +3722,22 @@
       </p:grpSpPr>
       <p:sp>
         <p:nvSpPr>
-          <p:cNvPr id="120" name="TextShape 1"/>
-          <p:cNvSpPr txBox="1"/>
+          <p:cNvPr id="114" name="CustomShape 1"/>
+          <p:cNvSpPr/>
           <p:nvPr/>
         </p:nvSpPr>
         <p:spPr>
           <a:xfrm>
             <a:off x="316080" y="246240"/>
-            <a:ext cx="9072360" cy="1362960"/>
-          </a:xfrm>
-          <a:prstGeom prst="rect">
-            <a:avLst/>
-          </a:prstGeom>
+            <a:ext cx="9071640" cy="1362240"/>
+          </a:xfrm>
+          <a:prstGeom prst="rect">
+            <a:avLst/>
+          </a:prstGeom>
+          <a:noFill/>
+          <a:ln>
+            <a:noFill/>
+          </a:ln>
         </p:spPr>
         <p:txBody>
           <a:bodyPr lIns="100800" rIns="100800" tIns="50400" bIns="50400" anchor="ctr"/>
@@ -3972,7 +3762,7 @@
       </p:sp>
       <p:pic>
         <p:nvPicPr>
-          <p:cNvPr id="121" name="" descr=""/>
+          <p:cNvPr id="115" name="" descr=""/>
           <p:cNvPicPr/>
           <p:nvPr/>
         </p:nvPicPr>
@@ -3985,7 +3775,7 @@
         <p:spPr>
           <a:xfrm>
             <a:off x="612000" y="1449720"/>
-            <a:ext cx="9172080" cy="5591160"/>
+            <a:ext cx="9171360" cy="5590440"/>
           </a:xfrm>
           <a:prstGeom prst="rect">
             <a:avLst/>
@@ -4049,18 +3839,22 @@
       </p:grpSpPr>
       <p:sp>
         <p:nvSpPr>
-          <p:cNvPr id="122" name="TextShape 1"/>
-          <p:cNvSpPr txBox="1"/>
+          <p:cNvPr id="116" name="CustomShape 1"/>
+          <p:cNvSpPr/>
           <p:nvPr/>
         </p:nvSpPr>
         <p:spPr>
           <a:xfrm>
             <a:off x="392040" y="246240"/>
-            <a:ext cx="9072360" cy="1362960"/>
-          </a:xfrm>
-          <a:prstGeom prst="rect">
-            <a:avLst/>
-          </a:prstGeom>
+            <a:ext cx="9071640" cy="1362240"/>
+          </a:xfrm>
+          <a:prstGeom prst="rect">
+            <a:avLst/>
+          </a:prstGeom>
+          <a:noFill/>
+          <a:ln>
+            <a:noFill/>
+          </a:ln>
         </p:spPr>
         <p:txBody>
           <a:bodyPr lIns="100800" rIns="100800" tIns="50400" bIns="50400" anchor="ctr"/>
@@ -4085,18 +3879,22 @@
       </p:sp>
       <p:sp>
         <p:nvSpPr>
-          <p:cNvPr id="123" name="TextShape 2"/>
-          <p:cNvSpPr txBox="1"/>
+          <p:cNvPr id="117" name="CustomShape 2"/>
+          <p:cNvSpPr/>
           <p:nvPr/>
         </p:nvSpPr>
         <p:spPr>
           <a:xfrm>
             <a:off x="0" y="2941560"/>
-            <a:ext cx="9072360" cy="4384440"/>
-          </a:xfrm>
-          <a:prstGeom prst="rect">
-            <a:avLst/>
-          </a:prstGeom>
+            <a:ext cx="9071640" cy="4383720"/>
+          </a:xfrm>
+          <a:prstGeom prst="rect">
+            <a:avLst/>
+          </a:prstGeom>
+          <a:noFill/>
+          <a:ln>
+            <a:noFill/>
+          </a:ln>
         </p:spPr>
         <p:txBody>
           <a:bodyPr lIns="100800" rIns="100800" tIns="50400" bIns="50400"/>
@@ -4107,7 +3905,7 @@
               </a:lnSpc>
               <a:buSzPct val="45000"/>
               <a:buFont typeface="StarSymbol"/>
-              <a:buChar char=""/>
+              <a:buChar char="l"/>
             </a:pPr>
             <a:r>
               <a:rPr lang="en-US" sz="2800">
@@ -4128,7 +3926,7 @@
               </a:lnSpc>
               <a:buSzPct val="45000"/>
               <a:buFont typeface="StarSymbol"/>
-              <a:buChar char=""/>
+              <a:buChar char="l"/>
             </a:pPr>
             <a:r>
               <a:rPr lang="en-US" sz="2800">
@@ -4144,9 +3942,12 @@
           </a:p>
           <a:p>
             <a:pPr lvl="1">
+              <a:lnSpc>
+                <a:spcPct val="100000"/>
+              </a:lnSpc>
               <a:buSzPct val="75000"/>
               <a:buFont typeface="StarSymbol"/>
-              <a:buChar char=""/>
+              <a:buChar char="l"/>
             </a:pPr>
             <a:r>
               <a:rPr lang="en-US" sz="2800">
@@ -4162,9 +3963,12 @@
           </a:p>
           <a:p>
             <a:pPr lvl="1">
+              <a:lnSpc>
+                <a:spcPct val="100000"/>
+              </a:lnSpc>
               <a:buSzPct val="75000"/>
               <a:buFont typeface="StarSymbol"/>
-              <a:buChar char=""/>
+              <a:buChar char="l"/>
             </a:pPr>
             <a:r>
               <a:rPr lang="en-US" sz="2800">
@@ -4234,18 +4038,22 @@
       </p:grpSpPr>
       <p:sp>
         <p:nvSpPr>
-          <p:cNvPr id="124" name="TextShape 1"/>
-          <p:cNvSpPr txBox="1"/>
+          <p:cNvPr id="118" name="CustomShape 1"/>
+          <p:cNvSpPr/>
           <p:nvPr/>
         </p:nvSpPr>
         <p:spPr>
           <a:xfrm>
             <a:off x="392040" y="246240"/>
-            <a:ext cx="9072360" cy="1362960"/>
-          </a:xfrm>
-          <a:prstGeom prst="rect">
-            <a:avLst/>
-          </a:prstGeom>
+            <a:ext cx="9071640" cy="1362240"/>
+          </a:xfrm>
+          <a:prstGeom prst="rect">
+            <a:avLst/>
+          </a:prstGeom>
+          <a:noFill/>
+          <a:ln>
+            <a:noFill/>
+          </a:ln>
         </p:spPr>
         <p:txBody>
           <a:bodyPr lIns="100800" rIns="100800" tIns="50400" bIns="50400" anchor="ctr"/>
@@ -4322,18 +4130,22 @@
       </p:grpSpPr>
       <p:sp>
         <p:nvSpPr>
-          <p:cNvPr id="94" name="TextShape 1"/>
-          <p:cNvSpPr txBox="1"/>
+          <p:cNvPr id="88" name="CustomShape 1"/>
+          <p:cNvSpPr/>
           <p:nvPr/>
         </p:nvSpPr>
         <p:spPr>
           <a:xfrm>
             <a:off x="239760" y="246240"/>
-            <a:ext cx="9072360" cy="1362960"/>
-          </a:xfrm>
-          <a:prstGeom prst="rect">
-            <a:avLst/>
-          </a:prstGeom>
+            <a:ext cx="9071640" cy="1362240"/>
+          </a:xfrm>
+          <a:prstGeom prst="rect">
+            <a:avLst/>
+          </a:prstGeom>
+          <a:noFill/>
+          <a:ln>
+            <a:noFill/>
+          </a:ln>
         </p:spPr>
         <p:txBody>
           <a:bodyPr lIns="100800" rIns="100800" tIns="50400" bIns="50400" anchor="ctr"/>
@@ -4358,18 +4170,22 @@
       </p:sp>
       <p:sp>
         <p:nvSpPr>
-          <p:cNvPr id="95" name="TextShape 2"/>
-          <p:cNvSpPr txBox="1"/>
+          <p:cNvPr id="89" name="CustomShape 2"/>
+          <p:cNvSpPr/>
           <p:nvPr/>
         </p:nvSpPr>
         <p:spPr>
           <a:xfrm>
             <a:off x="209160" y="1478520"/>
-            <a:ext cx="8934840" cy="2453400"/>
-          </a:xfrm>
-          <a:prstGeom prst="rect">
-            <a:avLst/>
-          </a:prstGeom>
+            <a:ext cx="8934120" cy="2452680"/>
+          </a:xfrm>
+          <a:prstGeom prst="rect">
+            <a:avLst/>
+          </a:prstGeom>
+          <a:noFill/>
+          <a:ln>
+            <a:noFill/>
+          </a:ln>
         </p:spPr>
         <p:txBody>
           <a:bodyPr lIns="100800" rIns="100800" tIns="50400" bIns="50400"/>
@@ -4380,7 +4196,7 @@
               </a:lnSpc>
               <a:buSzPct val="45000"/>
               <a:buFont typeface="StarSymbol"/>
-              <a:buChar char=""/>
+              <a:buChar char="l"/>
             </a:pPr>
             <a:r>
               <a:rPr lang="en-US" sz="2800">
@@ -4396,9 +4212,12 @@
           </a:p>
           <a:p>
             <a:pPr lvl="1">
+              <a:lnSpc>
+                <a:spcPct val="100000"/>
+              </a:lnSpc>
               <a:buSzPct val="75000"/>
               <a:buFont typeface="StarSymbol"/>
-              <a:buChar char=""/>
+              <a:buChar char="l"/>
             </a:pPr>
             <a:r>
               <a:rPr lang="en-US" sz="2800">
@@ -4414,9 +4233,12 @@
           </a:p>
           <a:p>
             <a:pPr lvl="1">
+              <a:lnSpc>
+                <a:spcPct val="100000"/>
+              </a:lnSpc>
               <a:buSzPct val="75000"/>
               <a:buFont typeface="StarSymbol"/>
-              <a:buChar char=""/>
+              <a:buChar char="l"/>
             </a:pPr>
             <a:r>
               <a:rPr lang="en-US" sz="2800">
@@ -4432,9 +4254,12 @@
           </a:p>
           <a:p>
             <a:pPr lvl="1">
+              <a:lnSpc>
+                <a:spcPct val="100000"/>
+              </a:lnSpc>
               <a:buSzPct val="75000"/>
               <a:buFont typeface="StarSymbol"/>
-              <a:buChar char=""/>
+              <a:buChar char="l"/>
             </a:pPr>
             <a:r>
               <a:rPr lang="en-US" sz="2800">
@@ -4452,7 +4277,7 @@
       </p:sp>
       <p:pic>
         <p:nvPicPr>
-          <p:cNvPr id="96" name="" descr=""/>
+          <p:cNvPr id="90" name="" descr=""/>
           <p:cNvPicPr/>
           <p:nvPr/>
         </p:nvPicPr>
@@ -4465,7 +4290,7 @@
         <p:spPr>
           <a:xfrm>
             <a:off x="3525840" y="3985560"/>
-            <a:ext cx="6349680" cy="3238200"/>
+            <a:ext cx="6348960" cy="3237480"/>
           </a:xfrm>
           <a:prstGeom prst="rect">
             <a:avLst/>
@@ -4529,18 +4354,22 @@
       </p:grpSpPr>
       <p:sp>
         <p:nvSpPr>
-          <p:cNvPr id="97" name="TextShape 1"/>
-          <p:cNvSpPr txBox="1"/>
+          <p:cNvPr id="91" name="CustomShape 1"/>
+          <p:cNvSpPr/>
           <p:nvPr/>
         </p:nvSpPr>
         <p:spPr>
           <a:xfrm>
             <a:off x="239760" y="246240"/>
-            <a:ext cx="9072360" cy="1362960"/>
-          </a:xfrm>
-          <a:prstGeom prst="rect">
-            <a:avLst/>
-          </a:prstGeom>
+            <a:ext cx="9071640" cy="1362240"/>
+          </a:xfrm>
+          <a:prstGeom prst="rect">
+            <a:avLst/>
+          </a:prstGeom>
+          <a:noFill/>
+          <a:ln>
+            <a:noFill/>
+          </a:ln>
         </p:spPr>
         <p:txBody>
           <a:bodyPr lIns="100800" rIns="100800" tIns="50400" bIns="50400" anchor="ctr"/>
@@ -4565,18 +4394,22 @@
       </p:sp>
       <p:sp>
         <p:nvSpPr>
-          <p:cNvPr id="98" name="TextShape 2"/>
-          <p:cNvSpPr txBox="1"/>
+          <p:cNvPr id="92" name="CustomShape 2"/>
+          <p:cNvSpPr/>
           <p:nvPr/>
         </p:nvSpPr>
         <p:spPr>
           <a:xfrm>
             <a:off x="209160" y="1478520"/>
-            <a:ext cx="9666360" cy="4647960"/>
-          </a:xfrm>
-          <a:prstGeom prst="rect">
-            <a:avLst/>
-          </a:prstGeom>
+            <a:ext cx="9665640" cy="4647240"/>
+          </a:xfrm>
+          <a:prstGeom prst="rect">
+            <a:avLst/>
+          </a:prstGeom>
+          <a:noFill/>
+          <a:ln>
+            <a:noFill/>
+          </a:ln>
         </p:spPr>
         <p:txBody>
           <a:bodyPr lIns="100800" rIns="100800" tIns="50400" bIns="50400"/>
@@ -4587,7 +4420,7 @@
               </a:lnSpc>
               <a:buSzPct val="45000"/>
               <a:buFont typeface="StarSymbol"/>
-              <a:buChar char=""/>
+              <a:buChar char="l"/>
             </a:pPr>
             <a:r>
               <a:rPr lang="en-US" sz="2800">
@@ -4608,7 +4441,7 @@
               </a:lnSpc>
               <a:buSzPct val="45000"/>
               <a:buFont typeface="StarSymbol"/>
-              <a:buChar char=""/>
+              <a:buChar char="l"/>
             </a:pPr>
             <a:r>
               <a:rPr lang="en-US" sz="2800">
@@ -4678,18 +4511,22 @@
       </p:grpSpPr>
       <p:sp>
         <p:nvSpPr>
-          <p:cNvPr id="99" name="TextShape 1"/>
-          <p:cNvSpPr txBox="1"/>
+          <p:cNvPr id="93" name="CustomShape 1"/>
+          <p:cNvSpPr/>
           <p:nvPr/>
         </p:nvSpPr>
         <p:spPr>
           <a:xfrm>
             <a:off x="239760" y="246240"/>
-            <a:ext cx="9072360" cy="1362960"/>
-          </a:xfrm>
-          <a:prstGeom prst="rect">
-            <a:avLst/>
-          </a:prstGeom>
+            <a:ext cx="9071640" cy="1362240"/>
+          </a:xfrm>
+          <a:prstGeom prst="rect">
+            <a:avLst/>
+          </a:prstGeom>
+          <a:noFill/>
+          <a:ln>
+            <a:noFill/>
+          </a:ln>
         </p:spPr>
         <p:txBody>
           <a:bodyPr lIns="100800" rIns="100800" tIns="50400" bIns="50400" anchor="ctr"/>
@@ -4714,18 +4551,22 @@
       </p:sp>
       <p:sp>
         <p:nvSpPr>
-          <p:cNvPr id="100" name="TextShape 2"/>
-          <p:cNvSpPr txBox="1"/>
+          <p:cNvPr id="94" name="CustomShape 2"/>
+          <p:cNvSpPr/>
           <p:nvPr/>
         </p:nvSpPr>
         <p:spPr>
           <a:xfrm>
             <a:off x="209520" y="1478880"/>
-            <a:ext cx="9666360" cy="4647960"/>
-          </a:xfrm>
-          <a:prstGeom prst="rect">
-            <a:avLst/>
-          </a:prstGeom>
+            <a:ext cx="9665640" cy="4647240"/>
+          </a:xfrm>
+          <a:prstGeom prst="rect">
+            <a:avLst/>
+          </a:prstGeom>
+          <a:noFill/>
+          <a:ln>
+            <a:noFill/>
+          </a:ln>
         </p:spPr>
         <p:txBody>
           <a:bodyPr lIns="100800" rIns="100800" tIns="50400" bIns="50400"/>
@@ -4736,7 +4577,7 @@
               </a:lnSpc>
               <a:buSzPct val="45000"/>
               <a:buFont typeface="StarSymbol"/>
-              <a:buChar char=""/>
+              <a:buChar char="l"/>
             </a:pPr>
             <a:r>
               <a:rPr lang="en-US" sz="2800">
@@ -4757,7 +4598,7 @@
               </a:lnSpc>
               <a:buSzPct val="45000"/>
               <a:buFont typeface="StarSymbol"/>
-              <a:buChar char=""/>
+              <a:buChar char="l"/>
             </a:pPr>
             <a:r>
               <a:rPr lang="en-US" sz="2800">
@@ -4798,7 +4639,7 @@
               </a:lnSpc>
               <a:buSzPct val="45000"/>
               <a:buFont typeface="StarSymbol"/>
-              <a:buChar char=""/>
+              <a:buChar char="l"/>
             </a:pPr>
             <a:r>
               <a:rPr lang="en-US" sz="2800">
@@ -4819,7 +4660,7 @@
               </a:lnSpc>
               <a:buSzPct val="45000"/>
               <a:buFont typeface="StarSymbol"/>
-              <a:buChar char=""/>
+              <a:buChar char="l"/>
             </a:pPr>
             <a:r>
               <a:rPr lang="en-US" sz="2800">
@@ -4833,11 +4674,32 @@
             </a:r>
             <a:endParaRPr/>
           </a:p>
+          <a:p>
+            <a:pPr>
+              <a:lnSpc>
+                <a:spcPct val="100000"/>
+              </a:lnSpc>
+              <a:buSzPct val="45000"/>
+              <a:buFont typeface="StarSymbol"/>
+              <a:buChar char="l"/>
+            </a:pPr>
+            <a:r>
+              <a:rPr lang="en-US" sz="2800">
+                <a:solidFill>
+                  <a:srgbClr val="464646"/>
+                </a:solidFill>
+                <a:latin typeface="Lucida Sans Unicode"/>
+                <a:ea typeface="Droid Sans Fallback"/>
+              </a:rPr>
+              <a:t>Isolation CPUs</a:t>
+            </a:r>
+            <a:endParaRPr/>
+          </a:p>
         </p:txBody>
       </p:sp>
       <p:pic>
         <p:nvPicPr>
-          <p:cNvPr id="101" name="" descr=""/>
+          <p:cNvPr id="95" name="" descr=""/>
           <p:cNvPicPr/>
           <p:nvPr/>
         </p:nvPicPr>
@@ -4850,7 +4712,7 @@
         <p:spPr>
           <a:xfrm>
             <a:off x="4663440" y="1429200"/>
-            <a:ext cx="5417280" cy="5154480"/>
+            <a:ext cx="5416560" cy="5153760"/>
           </a:xfrm>
           <a:prstGeom prst="rect">
             <a:avLst/>
@@ -4914,27 +4776,26 @@
       </p:grpSpPr>
       <p:sp>
         <p:nvSpPr>
-          <p:cNvPr id="102" name="TextShape 1"/>
-          <p:cNvSpPr txBox="1"/>
+          <p:cNvPr id="96" name="CustomShape 1"/>
+          <p:cNvSpPr/>
           <p:nvPr/>
         </p:nvSpPr>
         <p:spPr>
           <a:xfrm>
             <a:off x="316080" y="183600"/>
-            <a:ext cx="9072360" cy="1472760"/>
-          </a:xfrm>
-          <a:prstGeom prst="rect">
-            <a:avLst/>
-          </a:prstGeom>
+            <a:ext cx="9071640" cy="1472040"/>
+          </a:xfrm>
+          <a:prstGeom prst="rect">
+            <a:avLst/>
+          </a:prstGeom>
+          <a:noFill/>
+          <a:ln>
+            <a:noFill/>
+          </a:ln>
         </p:spPr>
         <p:txBody>
           <a:bodyPr lIns="100800" rIns="100800" tIns="50400" bIns="50400" anchor="ctr"/>
           <a:p>
-            <a:pPr>
-              <a:lnSpc>
-                <a:spcPct val="100000"/>
-              </a:lnSpc>
-            </a:pPr>
             <a:r>
               <a:rPr b="1" lang="en-US" sz="4500">
                 <a:solidFill>
@@ -4944,6 +4805,14 @@
               </a:rPr>
               <a:t>Wrapper: </a:t>
             </a:r>
+            <a:endParaRPr/>
+          </a:p>
+          <a:p>
+            <a:pPr>
+              <a:lnSpc>
+                <a:spcPct val="100000"/>
+              </a:lnSpc>
+            </a:pPr>
             <a:r>
               <a:rPr b="1" lang="en-US" sz="4500">
                 <a:solidFill>
@@ -4951,16 +4820,6 @@
                 </a:solidFill>
                 <a:latin typeface="Lucida Sans Unicode"/>
               </a:rPr>
-              <a:t>
-</a:t>
-            </a:r>
-            <a:r>
-              <a:rPr b="1" lang="en-US" sz="4500">
-                <a:solidFill>
-                  <a:srgbClr val="464646"/>
-                </a:solidFill>
-                <a:latin typeface="Lucida Sans Unicode"/>
-              </a:rPr>
               <a:t>Mesures des performances</a:t>
             </a:r>
             <a:endParaRPr/>
@@ -4969,18 +4828,22 @@
       </p:sp>
       <p:sp>
         <p:nvSpPr>
-          <p:cNvPr id="103" name="TextShape 2"/>
-          <p:cNvSpPr txBox="1"/>
+          <p:cNvPr id="97" name="CustomShape 2"/>
+          <p:cNvSpPr/>
           <p:nvPr/>
         </p:nvSpPr>
         <p:spPr>
           <a:xfrm>
             <a:off x="0" y="1768320"/>
-            <a:ext cx="9072360" cy="4384440"/>
-          </a:xfrm>
-          <a:prstGeom prst="rect">
-            <a:avLst/>
-          </a:prstGeom>
+            <a:ext cx="9071640" cy="4383720"/>
+          </a:xfrm>
+          <a:prstGeom prst="rect">
+            <a:avLst/>
+          </a:prstGeom>
+          <a:noFill/>
+          <a:ln>
+            <a:noFill/>
+          </a:ln>
         </p:spPr>
         <p:txBody>
           <a:bodyPr lIns="100800" rIns="100800" tIns="50400" bIns="50400"/>
@@ -4991,7 +4854,7 @@
               </a:lnSpc>
               <a:buSzPct val="45000"/>
               <a:buFont typeface="StarSymbol"/>
-              <a:buChar char=""/>
+              <a:buChar char="l"/>
             </a:pPr>
             <a:r>
               <a:rPr lang="en-US" sz="2800">
@@ -5012,7 +4875,7 @@
               </a:lnSpc>
               <a:buSzPct val="45000"/>
               <a:buFont typeface="StarSymbol"/>
-              <a:buChar char=""/>
+              <a:buChar char="l"/>
             </a:pPr>
             <a:r>
               <a:rPr lang="en-US" sz="2800">
@@ -5048,7 +4911,7 @@
       </p:sp>
       <p:pic>
         <p:nvPicPr>
-          <p:cNvPr id="104" name="Picture 3" descr=""/>
+          <p:cNvPr id="98" name="Picture 3" descr=""/>
           <p:cNvPicPr/>
           <p:nvPr/>
         </p:nvPicPr>
@@ -5061,7 +4924,7 @@
         <p:spPr>
           <a:xfrm>
             <a:off x="4735440" y="1874880"/>
-            <a:ext cx="5102640" cy="5257440"/>
+            <a:ext cx="5101920" cy="5256720"/>
           </a:xfrm>
           <a:prstGeom prst="rect">
             <a:avLst/>
@@ -5125,18 +4988,22 @@
       </p:grpSpPr>
       <p:sp>
         <p:nvSpPr>
-          <p:cNvPr id="105" name="TextShape 1"/>
-          <p:cNvSpPr txBox="1"/>
+          <p:cNvPr id="99" name="CustomShape 1"/>
+          <p:cNvSpPr/>
           <p:nvPr/>
         </p:nvSpPr>
         <p:spPr>
           <a:xfrm>
             <a:off x="392040" y="246240"/>
-            <a:ext cx="9072360" cy="1362960"/>
-          </a:xfrm>
-          <a:prstGeom prst="rect">
-            <a:avLst/>
-          </a:prstGeom>
+            <a:ext cx="9071640" cy="1362240"/>
+          </a:xfrm>
+          <a:prstGeom prst="rect">
+            <a:avLst/>
+          </a:prstGeom>
+          <a:noFill/>
+          <a:ln>
+            <a:noFill/>
+          </a:ln>
         </p:spPr>
         <p:txBody>
           <a:bodyPr lIns="100800" rIns="100800" tIns="50400" bIns="50400" anchor="ctr"/>
@@ -5161,18 +5028,22 @@
       </p:sp>
       <p:sp>
         <p:nvSpPr>
-          <p:cNvPr id="106" name="TextShape 2"/>
-          <p:cNvSpPr txBox="1"/>
+          <p:cNvPr id="100" name="CustomShape 2"/>
+          <p:cNvSpPr/>
           <p:nvPr/>
         </p:nvSpPr>
         <p:spPr>
           <a:xfrm>
             <a:off x="0" y="1768320"/>
-            <a:ext cx="9072360" cy="4384440"/>
-          </a:xfrm>
-          <a:prstGeom prst="rect">
-            <a:avLst/>
-          </a:prstGeom>
+            <a:ext cx="9071640" cy="4383720"/>
+          </a:xfrm>
+          <a:prstGeom prst="rect">
+            <a:avLst/>
+          </a:prstGeom>
+          <a:noFill/>
+          <a:ln>
+            <a:noFill/>
+          </a:ln>
         </p:spPr>
         <p:txBody>
           <a:bodyPr lIns="100800" rIns="100800" tIns="50400" bIns="50400"/>
@@ -5183,7 +5054,7 @@
               </a:lnSpc>
               <a:buSzPct val="45000"/>
               <a:buFont typeface="StarSymbol"/>
-              <a:buChar char=""/>
+              <a:buChar char="l"/>
             </a:pPr>
             <a:r>
               <a:rPr lang="en-US" sz="2800">
@@ -5204,7 +5075,7 @@
               </a:lnSpc>
               <a:buSzPct val="45000"/>
               <a:buFont typeface="StarSymbol"/>
-              <a:buChar char=""/>
+              <a:buChar char="l"/>
             </a:pPr>
             <a:r>
               <a:rPr lang="en-US" sz="2800">
@@ -5222,7 +5093,7 @@
       </p:sp>
       <p:pic>
         <p:nvPicPr>
-          <p:cNvPr id="107" name="Picture 4" descr=""/>
+          <p:cNvPr id="101" name="Picture 4" descr=""/>
           <p:cNvPicPr/>
           <p:nvPr/>
         </p:nvPicPr>
@@ -5235,7 +5106,7 @@
         <p:spPr>
           <a:xfrm>
             <a:off x="3897360" y="3322800"/>
-            <a:ext cx="6085440" cy="3713760"/>
+            <a:ext cx="6084720" cy="3713040"/>
           </a:xfrm>
           <a:prstGeom prst="rect">
             <a:avLst/>
@@ -5299,18 +5170,22 @@
       </p:grpSpPr>
       <p:sp>
         <p:nvSpPr>
-          <p:cNvPr id="108" name="TextShape 1"/>
-          <p:cNvSpPr txBox="1"/>
+          <p:cNvPr id="102" name="CustomShape 1"/>
+          <p:cNvSpPr/>
           <p:nvPr/>
         </p:nvSpPr>
         <p:spPr>
           <a:xfrm>
             <a:off x="239760" y="246240"/>
-            <a:ext cx="9072360" cy="1362960"/>
-          </a:xfrm>
-          <a:prstGeom prst="rect">
-            <a:avLst/>
-          </a:prstGeom>
+            <a:ext cx="9071640" cy="1362240"/>
+          </a:xfrm>
+          <a:prstGeom prst="rect">
+            <a:avLst/>
+          </a:prstGeom>
+          <a:noFill/>
+          <a:ln>
+            <a:noFill/>
+          </a:ln>
         </p:spPr>
         <p:txBody>
           <a:bodyPr lIns="100800" rIns="100800" tIns="50400" bIns="50400" anchor="ctr"/>
@@ -5335,18 +5210,22 @@
       </p:sp>
       <p:sp>
         <p:nvSpPr>
-          <p:cNvPr id="109" name="TextShape 2"/>
-          <p:cNvSpPr txBox="1"/>
+          <p:cNvPr id="103" name="CustomShape 2"/>
+          <p:cNvSpPr/>
           <p:nvPr/>
         </p:nvSpPr>
         <p:spPr>
           <a:xfrm>
             <a:off x="0" y="1768320"/>
-            <a:ext cx="9072360" cy="4384440"/>
-          </a:xfrm>
-          <a:prstGeom prst="rect">
-            <a:avLst/>
-          </a:prstGeom>
+            <a:ext cx="9071640" cy="4383720"/>
+          </a:xfrm>
+          <a:prstGeom prst="rect">
+            <a:avLst/>
+          </a:prstGeom>
+          <a:noFill/>
+          <a:ln>
+            <a:noFill/>
+          </a:ln>
         </p:spPr>
         <p:txBody>
           <a:bodyPr lIns="100800" rIns="100800" tIns="50400" bIns="50400"/>
@@ -5357,7 +5236,7 @@
               </a:lnSpc>
               <a:buSzPct val="45000"/>
               <a:buFont typeface="StarSymbol"/>
-              <a:buChar char=""/>
+              <a:buChar char="l"/>
             </a:pPr>
             <a:r>
               <a:rPr lang="en-US" sz="2800">
@@ -5378,7 +5257,7 @@
               </a:lnSpc>
               <a:buSzPct val="45000"/>
               <a:buFont typeface="StarSymbol"/>
-              <a:buChar char=""/>
+              <a:buChar char="l"/>
             </a:pPr>
             <a:r>
               <a:rPr lang="en-US" sz="2800">
@@ -5399,7 +5278,7 @@
               </a:lnSpc>
               <a:buSzPct val="45000"/>
               <a:buFont typeface="StarSymbol"/>
-              <a:buChar char=""/>
+              <a:buChar char="l"/>
             </a:pPr>
             <a:r>
               <a:rPr lang="en-US" sz="2800">
@@ -5417,7 +5296,7 @@
       </p:sp>
       <p:pic>
         <p:nvPicPr>
-          <p:cNvPr id="110" name="Picture 3" descr=""/>
+          <p:cNvPr id="104" name="Picture 3" descr=""/>
           <p:cNvPicPr/>
           <p:nvPr/>
         </p:nvPicPr>
@@ -5430,7 +5309,7 @@
         <p:spPr>
           <a:xfrm>
             <a:off x="3211560" y="3438360"/>
-            <a:ext cx="6865200" cy="3501720"/>
+            <a:ext cx="6864480" cy="3501000"/>
           </a:xfrm>
           <a:prstGeom prst="rect">
             <a:avLst/>
@@ -5494,18 +5373,22 @@
       </p:grpSpPr>
       <p:sp>
         <p:nvSpPr>
-          <p:cNvPr id="111" name="TextShape 1"/>
-          <p:cNvSpPr txBox="1"/>
+          <p:cNvPr id="105" name="CustomShape 1"/>
+          <p:cNvSpPr/>
           <p:nvPr/>
         </p:nvSpPr>
         <p:spPr>
           <a:xfrm>
             <a:off x="0" y="301680"/>
-            <a:ext cx="9072360" cy="1261800"/>
-          </a:xfrm>
-          <a:prstGeom prst="rect">
-            <a:avLst/>
-          </a:prstGeom>
+            <a:ext cx="9071640" cy="1261080"/>
+          </a:xfrm>
+          <a:prstGeom prst="rect">
+            <a:avLst/>
+          </a:prstGeom>
+          <a:noFill/>
+          <a:ln>
+            <a:noFill/>
+          </a:ln>
         </p:spPr>
         <p:txBody>
           <a:bodyPr lIns="100800" rIns="100800" tIns="50400" bIns="50400" anchor="ctr"/>
@@ -5530,7 +5413,7 @@
       </p:sp>
       <p:pic>
         <p:nvPicPr>
-          <p:cNvPr id="112" name="" descr=""/>
+          <p:cNvPr id="106" name="" descr=""/>
           <p:cNvPicPr/>
           <p:nvPr/>
         </p:nvPicPr>
@@ -5543,7 +5426,7 @@
         <p:spPr>
           <a:xfrm>
             <a:off x="802440" y="1645920"/>
-            <a:ext cx="8981640" cy="5486400"/>
+            <a:ext cx="8980920" cy="5485680"/>
           </a:xfrm>
           <a:prstGeom prst="rect">
             <a:avLst/>
@@ -5607,18 +5490,22 @@
       </p:grpSpPr>
       <p:sp>
         <p:nvSpPr>
-          <p:cNvPr id="113" name="TextShape 1"/>
-          <p:cNvSpPr txBox="1"/>
+          <p:cNvPr id="107" name="CustomShape 1"/>
+          <p:cNvSpPr/>
           <p:nvPr/>
         </p:nvSpPr>
         <p:spPr>
           <a:xfrm>
             <a:off x="316080" y="274680"/>
-            <a:ext cx="9072360" cy="1261800"/>
-          </a:xfrm>
-          <a:prstGeom prst="rect">
-            <a:avLst/>
-          </a:prstGeom>
+            <a:ext cx="9071640" cy="1261080"/>
+          </a:xfrm>
+          <a:prstGeom prst="rect">
+            <a:avLst/>
+          </a:prstGeom>
+          <a:noFill/>
+          <a:ln>
+            <a:noFill/>
+          </a:ln>
         </p:spPr>
         <p:txBody>
           <a:bodyPr lIns="100800" rIns="100800" tIns="50400" bIns="50400" anchor="ctr"/>
@@ -5643,18 +5530,22 @@
       </p:sp>
       <p:sp>
         <p:nvSpPr>
-          <p:cNvPr id="114" name="TextShape 2"/>
-          <p:cNvSpPr txBox="1"/>
+          <p:cNvPr id="108" name="CustomShape 2"/>
+          <p:cNvSpPr/>
           <p:nvPr/>
         </p:nvSpPr>
         <p:spPr>
           <a:xfrm>
             <a:off x="392040" y="2865600"/>
-            <a:ext cx="9072360" cy="4384440"/>
-          </a:xfrm>
-          <a:prstGeom prst="rect">
-            <a:avLst/>
-          </a:prstGeom>
+            <a:ext cx="9071640" cy="4383720"/>
+          </a:xfrm>
+          <a:prstGeom prst="rect">
+            <a:avLst/>
+          </a:prstGeom>
+          <a:noFill/>
+          <a:ln>
+            <a:noFill/>
+          </a:ln>
         </p:spPr>
         <p:txBody>
           <a:bodyPr lIns="100800" rIns="100800" tIns="50400" bIns="50400"/>
@@ -5665,7 +5556,7 @@
               </a:lnSpc>
               <a:buSzPct val="45000"/>
               <a:buFont typeface="StarSymbol"/>
-              <a:buChar char=""/>
+              <a:buChar char="l"/>
             </a:pPr>
             <a:r>
               <a:rPr lang="en-US" sz="2800">
@@ -5686,7 +5577,7 @@
               </a:lnSpc>
               <a:buSzPct val="45000"/>
               <a:buFont typeface="StarSymbol"/>
-              <a:buChar char=""/>
+              <a:buChar char="l"/>
             </a:pPr>
             <a:r>
               <a:rPr lang="en-US" sz="2800">
@@ -5707,7 +5598,7 @@
               </a:lnSpc>
               <a:buSzPct val="45000"/>
               <a:buFont typeface="StarSymbol"/>
-              <a:buChar char=""/>
+              <a:buChar char="l"/>
             </a:pPr>
             <a:r>
               <a:rPr lang="en-US" sz="2800">

</xml_diff>